<commit_message>
fix pp by haphuongn739
</commit_message>
<xml_diff>
--- a/Nhóm 3.pptx
+++ b/Nhóm 3.pptx
@@ -125,7 +125,7 @@
   </p:defaultTextStyle>
   <p:extLst>
     <p:ext uri="{EFAFB233-063F-42B5-8137-9DF3F51BA10A}">
-      <p15:sldGuideLst xmlns:p15="http://schemas.microsoft.com/office/powerpoint/2012/main" xmlns="">
+      <p15:sldGuideLst xmlns:p15="http://schemas.microsoft.com/office/powerpoint/2012/main">
         <p15:guide id="1" orient="horz" pos="2160">
           <p15:clr>
             <a:srgbClr val="A4A3A4"/>
@@ -7415,7 +7415,7 @@
         </p:nvGraphicFramePr>
         <p:xfrm>
           <a:off x="914400" y="2083911"/>
-          <a:ext cx="7467600" cy="3698617"/>
+          <a:ext cx="7467600" cy="3863340"/>
         </p:xfrm>
         <a:graphic>
           <a:graphicData uri="http://schemas.openxmlformats.org/drawingml/2006/table">
@@ -7424,12 +7424,48 @@
                 <a:tableStyleId>{5C22544A-7EE6-4342-B048-85BDC9FD1C3A}</a:tableStyleId>
               </a:tblPr>
               <a:tblGrid>
-                <a:gridCol w="445827"/>
-                <a:gridCol w="1058839"/>
-                <a:gridCol w="1783307"/>
-                <a:gridCol w="1058839"/>
-                <a:gridCol w="2061949"/>
-                <a:gridCol w="1058839"/>
+                <a:gridCol w="445827">
+                  <a:extLst>
+                    <a:ext uri="{9D8B030D-6E8A-4147-A177-3AD203B41FA5}">
+                      <a16:colId xmlns:a16="http://schemas.microsoft.com/office/drawing/2014/main" val="20000"/>
+                    </a:ext>
+                  </a:extLst>
+                </a:gridCol>
+                <a:gridCol w="1058839">
+                  <a:extLst>
+                    <a:ext uri="{9D8B030D-6E8A-4147-A177-3AD203B41FA5}">
+                      <a16:colId xmlns:a16="http://schemas.microsoft.com/office/drawing/2014/main" val="20001"/>
+                    </a:ext>
+                  </a:extLst>
+                </a:gridCol>
+                <a:gridCol w="1783307">
+                  <a:extLst>
+                    <a:ext uri="{9D8B030D-6E8A-4147-A177-3AD203B41FA5}">
+                      <a16:colId xmlns:a16="http://schemas.microsoft.com/office/drawing/2014/main" val="20002"/>
+                    </a:ext>
+                  </a:extLst>
+                </a:gridCol>
+                <a:gridCol w="1058839">
+                  <a:extLst>
+                    <a:ext uri="{9D8B030D-6E8A-4147-A177-3AD203B41FA5}">
+                      <a16:colId xmlns:a16="http://schemas.microsoft.com/office/drawing/2014/main" val="20003"/>
+                    </a:ext>
+                  </a:extLst>
+                </a:gridCol>
+                <a:gridCol w="2061949">
+                  <a:extLst>
+                    <a:ext uri="{9D8B030D-6E8A-4147-A177-3AD203B41FA5}">
+                      <a16:colId xmlns:a16="http://schemas.microsoft.com/office/drawing/2014/main" val="20004"/>
+                    </a:ext>
+                  </a:extLst>
+                </a:gridCol>
+                <a:gridCol w="1058839">
+                  <a:extLst>
+                    <a:ext uri="{9D8B030D-6E8A-4147-A177-3AD203B41FA5}">
+                      <a16:colId xmlns:a16="http://schemas.microsoft.com/office/drawing/2014/main" val="20005"/>
+                    </a:ext>
+                  </a:extLst>
+                </a:gridCol>
               </a:tblGrid>
               <a:tr h="289787">
                 <a:tc>
@@ -7624,6 +7660,11 @@
                   </a:txBody>
                   <a:tcPr marL="66874" marR="66874" marT="0" marB="0" anchor="ctr"/>
                 </a:tc>
+                <a:extLst>
+                  <a:ext uri="{0D108BD9-81ED-4DB2-BD59-A6C34878D82A}">
+                    <a16:rowId xmlns:a16="http://schemas.microsoft.com/office/drawing/2014/main" val="10000"/>
+                  </a:ext>
+                </a:extLst>
               </a:tr>
               <a:tr h="450780">
                 <a:tc>
@@ -7818,6 +7859,11 @@
                   </a:txBody>
                   <a:tcPr marL="66874" marR="66874" marT="0" marB="0" anchor="ctr"/>
                 </a:tc>
+                <a:extLst>
+                  <a:ext uri="{0D108BD9-81ED-4DB2-BD59-A6C34878D82A}">
+                    <a16:rowId xmlns:a16="http://schemas.microsoft.com/office/drawing/2014/main" val="10001"/>
+                  </a:ext>
+                </a:extLst>
               </a:tr>
               <a:tr h="579575">
                 <a:tc>
@@ -8012,6 +8058,11 @@
                   </a:txBody>
                   <a:tcPr marL="66874" marR="66874" marT="0" marB="0" anchor="ctr"/>
                 </a:tc>
+                <a:extLst>
+                  <a:ext uri="{0D108BD9-81ED-4DB2-BD59-A6C34878D82A}">
+                    <a16:rowId xmlns:a16="http://schemas.microsoft.com/office/drawing/2014/main" val="10002"/>
+                  </a:ext>
+                </a:extLst>
               </a:tr>
               <a:tr h="289787">
                 <a:tc>
@@ -8206,6 +8257,11 @@
                   </a:txBody>
                   <a:tcPr marL="66874" marR="66874" marT="0" marB="0" anchor="ctr"/>
                 </a:tc>
+                <a:extLst>
+                  <a:ext uri="{0D108BD9-81ED-4DB2-BD59-A6C34878D82A}">
+                    <a16:rowId xmlns:a16="http://schemas.microsoft.com/office/drawing/2014/main" val="10003"/>
+                  </a:ext>
+                </a:extLst>
               </a:tr>
               <a:tr h="289787">
                 <a:tc>
@@ -8400,6 +8456,11 @@
                   </a:txBody>
                   <a:tcPr marL="66874" marR="66874" marT="0" marB="0" anchor="ctr"/>
                 </a:tc>
+                <a:extLst>
+                  <a:ext uri="{0D108BD9-81ED-4DB2-BD59-A6C34878D82A}">
+                    <a16:rowId xmlns:a16="http://schemas.microsoft.com/office/drawing/2014/main" val="10004"/>
+                  </a:ext>
+                </a:extLst>
               </a:tr>
               <a:tr h="289787">
                 <a:tc>
@@ -8594,6 +8655,11 @@
                   </a:txBody>
                   <a:tcPr marL="66874" marR="66874" marT="0" marB="0" anchor="ctr"/>
                 </a:tc>
+                <a:extLst>
+                  <a:ext uri="{0D108BD9-81ED-4DB2-BD59-A6C34878D82A}">
+                    <a16:rowId xmlns:a16="http://schemas.microsoft.com/office/drawing/2014/main" val="10005"/>
+                  </a:ext>
+                </a:extLst>
               </a:tr>
               <a:tr h="579575">
                 <a:tc>
@@ -8788,6 +8854,11 @@
                   </a:txBody>
                   <a:tcPr marL="66874" marR="66874" marT="0" marB="0" anchor="ctr"/>
                 </a:tc>
+                <a:extLst>
+                  <a:ext uri="{0D108BD9-81ED-4DB2-BD59-A6C34878D82A}">
+                    <a16:rowId xmlns:a16="http://schemas.microsoft.com/office/drawing/2014/main" val="10006"/>
+                  </a:ext>
+                </a:extLst>
               </a:tr>
             </a:tbl>
           </a:graphicData>
@@ -11041,98 +11112,710 @@
           </a:bodyPr>
           <a:lstStyle/>
           <a:p>
+            <a:pPr marL="457200" indent="-457200">
+              <a:buAutoNum type="arabicPeriod"/>
+            </a:pPr>
+            <a:r>
+              <a:rPr lang="en-US" sz="2400" dirty="0" err="1" smtClean="0">
+                <a:latin typeface="Arial" panose="020B0604020202020204" pitchFamily="34" charset="0"/>
+                <a:cs typeface="Arial" panose="020B0604020202020204" pitchFamily="34" charset="0"/>
+              </a:rPr>
+              <a:t>Kịch</a:t>
+            </a:r>
+            <a:r>
+              <a:rPr lang="en-US" sz="2400" dirty="0" smtClean="0">
+                <a:latin typeface="Arial" panose="020B0604020202020204" pitchFamily="34" charset="0"/>
+                <a:cs typeface="Arial" panose="020B0604020202020204" pitchFamily="34" charset="0"/>
+              </a:rPr>
+              <a:t> </a:t>
+            </a:r>
+            <a:r>
+              <a:rPr lang="en-US" sz="2400" dirty="0" err="1" smtClean="0">
+                <a:latin typeface="Arial" panose="020B0604020202020204" pitchFamily="34" charset="0"/>
+                <a:cs typeface="Arial" panose="020B0604020202020204" pitchFamily="34" charset="0"/>
+              </a:rPr>
+              <a:t>bản</a:t>
+            </a:r>
+            <a:r>
+              <a:rPr lang="en-US" sz="2400" dirty="0">
+                <a:latin typeface="Arial" panose="020B0604020202020204" pitchFamily="34" charset="0"/>
+                <a:cs typeface="Arial" panose="020B0604020202020204" pitchFamily="34" charset="0"/>
+              </a:rPr>
+              <a:t> </a:t>
+            </a:r>
+            <a:r>
+              <a:rPr lang="en-US" sz="2400" dirty="0" smtClean="0">
+                <a:latin typeface="Arial" panose="020B0604020202020204" pitchFamily="34" charset="0"/>
+                <a:cs typeface="Arial" panose="020B0604020202020204" pitchFamily="34" charset="0"/>
+              </a:rPr>
+              <a:t>(</a:t>
+            </a:r>
+            <a:r>
+              <a:rPr lang="en-US" sz="2400" dirty="0" err="1" smtClean="0">
+                <a:latin typeface="Arial" panose="020B0604020202020204" pitchFamily="34" charset="0"/>
+                <a:cs typeface="Arial" panose="020B0604020202020204" pitchFamily="34" charset="0"/>
+              </a:rPr>
+              <a:t>Cảnh</a:t>
+            </a:r>
+            <a:r>
+              <a:rPr lang="en-US" sz="2400" dirty="0" smtClean="0">
+                <a:latin typeface="Arial" panose="020B0604020202020204" pitchFamily="34" charset="0"/>
+                <a:cs typeface="Arial" panose="020B0604020202020204" pitchFamily="34" charset="0"/>
+              </a:rPr>
+              <a:t> quay, </a:t>
+            </a:r>
+            <a:r>
+              <a:rPr lang="en-US" sz="2400" dirty="0" err="1" smtClean="0">
+                <a:latin typeface="Arial" panose="020B0604020202020204" pitchFamily="34" charset="0"/>
+                <a:cs typeface="Arial" panose="020B0604020202020204" pitchFamily="34" charset="0"/>
+              </a:rPr>
+              <a:t>Người</a:t>
+            </a:r>
+            <a:r>
+              <a:rPr lang="en-US" sz="2400" dirty="0" smtClean="0">
+                <a:latin typeface="Arial" panose="020B0604020202020204" pitchFamily="34" charset="0"/>
+                <a:cs typeface="Arial" panose="020B0604020202020204" pitchFamily="34" charset="0"/>
+              </a:rPr>
+              <a:t> </a:t>
+            </a:r>
+            <a:r>
+              <a:rPr lang="en-US" sz="2400" dirty="0" err="1" smtClean="0">
+                <a:latin typeface="Arial" panose="020B0604020202020204" pitchFamily="34" charset="0"/>
+                <a:cs typeface="Arial" panose="020B0604020202020204" pitchFamily="34" charset="0"/>
+              </a:rPr>
+              <a:t>đc</a:t>
+            </a:r>
+            <a:r>
+              <a:rPr lang="en-US" sz="2400" dirty="0" smtClean="0">
+                <a:latin typeface="Arial" panose="020B0604020202020204" pitchFamily="34" charset="0"/>
+                <a:cs typeface="Arial" panose="020B0604020202020204" pitchFamily="34" charset="0"/>
+              </a:rPr>
+              <a:t> </a:t>
+            </a:r>
+            <a:r>
+              <a:rPr lang="en-US" sz="2400" dirty="0" err="1" smtClean="0">
+                <a:latin typeface="Arial" panose="020B0604020202020204" pitchFamily="34" charset="0"/>
+                <a:cs typeface="Arial" panose="020B0604020202020204" pitchFamily="34" charset="0"/>
+              </a:rPr>
+              <a:t>phỏng</a:t>
+            </a:r>
+            <a:r>
+              <a:rPr lang="en-US" sz="2400" dirty="0" smtClean="0">
+                <a:latin typeface="Arial" panose="020B0604020202020204" pitchFamily="34" charset="0"/>
+                <a:cs typeface="Arial" panose="020B0604020202020204" pitchFamily="34" charset="0"/>
+              </a:rPr>
+              <a:t> </a:t>
+            </a:r>
+            <a:r>
+              <a:rPr lang="en-US" sz="2400" dirty="0" err="1" smtClean="0">
+                <a:latin typeface="Arial" panose="020B0604020202020204" pitchFamily="34" charset="0"/>
+                <a:cs typeface="Arial" panose="020B0604020202020204" pitchFamily="34" charset="0"/>
+              </a:rPr>
+              <a:t>vấn</a:t>
+            </a:r>
+            <a:r>
+              <a:rPr lang="en-US" sz="2400" dirty="0" smtClean="0">
+                <a:latin typeface="Arial" panose="020B0604020202020204" pitchFamily="34" charset="0"/>
+                <a:cs typeface="Arial" panose="020B0604020202020204" pitchFamily="34" charset="0"/>
+              </a:rPr>
+              <a:t>, </a:t>
+            </a:r>
+            <a:r>
+              <a:rPr lang="en-US" sz="2400" dirty="0" err="1" smtClean="0">
+                <a:latin typeface="Arial" panose="020B0604020202020204" pitchFamily="34" charset="0"/>
+                <a:cs typeface="Arial" panose="020B0604020202020204" pitchFamily="34" charset="0"/>
+              </a:rPr>
+              <a:t>nội</a:t>
+            </a:r>
+            <a:r>
+              <a:rPr lang="en-US" sz="2400" dirty="0" smtClean="0">
+                <a:latin typeface="Arial" panose="020B0604020202020204" pitchFamily="34" charset="0"/>
+                <a:cs typeface="Arial" panose="020B0604020202020204" pitchFamily="34" charset="0"/>
+              </a:rPr>
+              <a:t> dung </a:t>
+            </a:r>
+            <a:r>
+              <a:rPr lang="en-US" sz="2400" dirty="0" err="1" smtClean="0">
+                <a:latin typeface="Arial" panose="020B0604020202020204" pitchFamily="34" charset="0"/>
+                <a:cs typeface="Arial" panose="020B0604020202020204" pitchFamily="34" charset="0"/>
+              </a:rPr>
+              <a:t>phỏng</a:t>
+            </a:r>
+            <a:r>
+              <a:rPr lang="en-US" sz="2400" dirty="0" smtClean="0">
+                <a:latin typeface="Arial" panose="020B0604020202020204" pitchFamily="34" charset="0"/>
+                <a:cs typeface="Arial" panose="020B0604020202020204" pitchFamily="34" charset="0"/>
+              </a:rPr>
+              <a:t> </a:t>
+            </a:r>
+            <a:r>
+              <a:rPr lang="en-US" sz="2400" dirty="0" err="1" smtClean="0">
+                <a:latin typeface="Arial" panose="020B0604020202020204" pitchFamily="34" charset="0"/>
+                <a:cs typeface="Arial" panose="020B0604020202020204" pitchFamily="34" charset="0"/>
+              </a:rPr>
+              <a:t>vấn</a:t>
+            </a:r>
+            <a:r>
+              <a:rPr lang="en-US" sz="2400" dirty="0" smtClean="0">
+                <a:latin typeface="Arial" panose="020B0604020202020204" pitchFamily="34" charset="0"/>
+                <a:cs typeface="Arial" panose="020B0604020202020204" pitchFamily="34" charset="0"/>
+              </a:rPr>
+              <a:t>)</a:t>
+            </a:r>
+          </a:p>
+          <a:p>
+            <a:pPr marL="457200" indent="-457200">
+              <a:buFont typeface="+mj-lt"/>
+              <a:buAutoNum type="alphaLcParenR"/>
+            </a:pPr>
+            <a:r>
+              <a:rPr lang="en-US" sz="2400" dirty="0" err="1" smtClean="0">
+                <a:latin typeface="Arial" panose="020B0604020202020204" pitchFamily="34" charset="0"/>
+                <a:cs typeface="Arial" panose="020B0604020202020204" pitchFamily="34" charset="0"/>
+              </a:rPr>
+              <a:t>Cảnh</a:t>
+            </a:r>
+            <a:r>
+              <a:rPr lang="en-US" sz="2400" dirty="0" smtClean="0">
+                <a:latin typeface="Arial" panose="020B0604020202020204" pitchFamily="34" charset="0"/>
+                <a:cs typeface="Arial" panose="020B0604020202020204" pitchFamily="34" charset="0"/>
+              </a:rPr>
+              <a:t> quay : </a:t>
+            </a:r>
+            <a:r>
+              <a:rPr lang="en-US" sz="2400" dirty="0" err="1" smtClean="0">
+                <a:latin typeface="Arial" panose="020B0604020202020204" pitchFamily="34" charset="0"/>
+                <a:cs typeface="Arial" panose="020B0604020202020204" pitchFamily="34" charset="0"/>
+              </a:rPr>
+              <a:t>Tầng</a:t>
+            </a:r>
+            <a:r>
+              <a:rPr lang="en-US" sz="2400" dirty="0" smtClean="0">
+                <a:latin typeface="Arial" panose="020B0604020202020204" pitchFamily="34" charset="0"/>
+                <a:cs typeface="Arial" panose="020B0604020202020204" pitchFamily="34" charset="0"/>
+              </a:rPr>
+              <a:t> 1 </a:t>
+            </a:r>
+            <a:r>
+              <a:rPr lang="en-US" sz="2400" dirty="0" err="1" smtClean="0">
+                <a:latin typeface="Arial" panose="020B0604020202020204" pitchFamily="34" charset="0"/>
+                <a:cs typeface="Arial" panose="020B0604020202020204" pitchFamily="34" charset="0"/>
+              </a:rPr>
+              <a:t>tòa</a:t>
+            </a:r>
+            <a:r>
+              <a:rPr lang="en-US" sz="2400" dirty="0" smtClean="0">
+                <a:latin typeface="Arial" panose="020B0604020202020204" pitchFamily="34" charset="0"/>
+                <a:cs typeface="Arial" panose="020B0604020202020204" pitchFamily="34" charset="0"/>
+              </a:rPr>
+              <a:t> </a:t>
+            </a:r>
+            <a:r>
+              <a:rPr lang="en-US" sz="2400" dirty="0" err="1" smtClean="0">
+                <a:latin typeface="Arial" panose="020B0604020202020204" pitchFamily="34" charset="0"/>
+                <a:cs typeface="Arial" panose="020B0604020202020204" pitchFamily="34" charset="0"/>
+              </a:rPr>
+              <a:t>nhà</a:t>
+            </a:r>
+            <a:r>
+              <a:rPr lang="en-US" sz="2400" dirty="0" smtClean="0">
+                <a:latin typeface="Arial" panose="020B0604020202020204" pitchFamily="34" charset="0"/>
+                <a:cs typeface="Arial" panose="020B0604020202020204" pitchFamily="34" charset="0"/>
+              </a:rPr>
+              <a:t> </a:t>
+            </a:r>
+            <a:r>
+              <a:rPr lang="en-US" sz="2400" dirty="0" err="1" smtClean="0">
+                <a:latin typeface="Arial" panose="020B0604020202020204" pitchFamily="34" charset="0"/>
+                <a:cs typeface="Arial" panose="020B0604020202020204" pitchFamily="34" charset="0"/>
+              </a:rPr>
+              <a:t>WASECO,trước</a:t>
+            </a:r>
+            <a:r>
+              <a:rPr lang="en-US" sz="2400" dirty="0" smtClean="0">
+                <a:latin typeface="Arial" panose="020B0604020202020204" pitchFamily="34" charset="0"/>
+                <a:cs typeface="Arial" panose="020B0604020202020204" pitchFamily="34" charset="0"/>
+              </a:rPr>
+              <a:t> </a:t>
+            </a:r>
+            <a:r>
+              <a:rPr lang="en-US" sz="2400" dirty="0" err="1" smtClean="0">
+                <a:latin typeface="Arial" panose="020B0604020202020204" pitchFamily="34" charset="0"/>
+                <a:cs typeface="Arial" panose="020B0604020202020204" pitchFamily="34" charset="0"/>
+              </a:rPr>
+              <a:t>cửa</a:t>
+            </a:r>
+            <a:r>
+              <a:rPr lang="en-US" sz="2400" dirty="0" smtClean="0">
+                <a:latin typeface="Arial" panose="020B0604020202020204" pitchFamily="34" charset="0"/>
+                <a:cs typeface="Arial" panose="020B0604020202020204" pitchFamily="34" charset="0"/>
+              </a:rPr>
+              <a:t> </a:t>
+            </a:r>
+            <a:r>
+              <a:rPr lang="en-US" sz="2400" dirty="0" err="1" smtClean="0">
+                <a:latin typeface="Arial" panose="020B0604020202020204" pitchFamily="34" charset="0"/>
+                <a:cs typeface="Arial" panose="020B0604020202020204" pitchFamily="34" charset="0"/>
+              </a:rPr>
+              <a:t>văn</a:t>
+            </a:r>
+            <a:r>
+              <a:rPr lang="en-US" sz="2400" dirty="0" smtClean="0">
+                <a:latin typeface="Arial" panose="020B0604020202020204" pitchFamily="34" charset="0"/>
+                <a:cs typeface="Arial" panose="020B0604020202020204" pitchFamily="34" charset="0"/>
+              </a:rPr>
+              <a:t> </a:t>
+            </a:r>
+            <a:r>
+              <a:rPr lang="en-US" sz="2400" dirty="0" err="1" smtClean="0">
+                <a:latin typeface="Arial" panose="020B0604020202020204" pitchFamily="34" charset="0"/>
+                <a:cs typeface="Arial" panose="020B0604020202020204" pitchFamily="34" charset="0"/>
+              </a:rPr>
+              <a:t>phòng</a:t>
+            </a:r>
+            <a:r>
+              <a:rPr lang="en-US" sz="2400" dirty="0" smtClean="0">
+                <a:latin typeface="Arial" panose="020B0604020202020204" pitchFamily="34" charset="0"/>
+                <a:cs typeface="Arial" panose="020B0604020202020204" pitchFamily="34" charset="0"/>
+              </a:rPr>
+              <a:t> </a:t>
+            </a:r>
+            <a:r>
+              <a:rPr lang="en-US" sz="2400" dirty="0" err="1" smtClean="0">
+                <a:latin typeface="Arial" panose="020B0604020202020204" pitchFamily="34" charset="0"/>
+                <a:cs typeface="Arial" panose="020B0604020202020204" pitchFamily="34" charset="0"/>
+              </a:rPr>
+              <a:t>Công</a:t>
+            </a:r>
+            <a:r>
+              <a:rPr lang="en-US" sz="2400" dirty="0" smtClean="0">
+                <a:latin typeface="Arial" panose="020B0604020202020204" pitchFamily="34" charset="0"/>
+                <a:cs typeface="Arial" panose="020B0604020202020204" pitchFamily="34" charset="0"/>
+              </a:rPr>
+              <a:t> Ty TNHH FUJINET SYSTEMS.</a:t>
+            </a:r>
+          </a:p>
+          <a:p>
+            <a:pPr marL="457200" indent="-457200">
+              <a:buFont typeface="+mj-lt"/>
+              <a:buAutoNum type="alphaLcParenR"/>
+            </a:pPr>
+            <a:r>
+              <a:rPr lang="en-US" sz="2400" dirty="0" err="1" smtClean="0">
+                <a:latin typeface="Arial" panose="020B0604020202020204" pitchFamily="34" charset="0"/>
+                <a:cs typeface="Arial" panose="020B0604020202020204" pitchFamily="34" charset="0"/>
+              </a:rPr>
+              <a:t>Người</a:t>
+            </a:r>
+            <a:r>
+              <a:rPr lang="en-US" sz="2400" dirty="0" smtClean="0">
+                <a:latin typeface="Arial" panose="020B0604020202020204" pitchFamily="34" charset="0"/>
+                <a:cs typeface="Arial" panose="020B0604020202020204" pitchFamily="34" charset="0"/>
+              </a:rPr>
+              <a:t> </a:t>
+            </a:r>
+            <a:r>
+              <a:rPr lang="en-US" sz="2400" dirty="0" err="1" smtClean="0">
+                <a:latin typeface="Arial" panose="020B0604020202020204" pitchFamily="34" charset="0"/>
+                <a:cs typeface="Arial" panose="020B0604020202020204" pitchFamily="34" charset="0"/>
+              </a:rPr>
+              <a:t>được</a:t>
+            </a:r>
+            <a:r>
+              <a:rPr lang="en-US" sz="2400" dirty="0" smtClean="0">
+                <a:latin typeface="Arial" panose="020B0604020202020204" pitchFamily="34" charset="0"/>
+                <a:cs typeface="Arial" panose="020B0604020202020204" pitchFamily="34" charset="0"/>
+              </a:rPr>
+              <a:t> </a:t>
+            </a:r>
+            <a:r>
+              <a:rPr lang="en-US" sz="2400" dirty="0" err="1" smtClean="0">
+                <a:latin typeface="Arial" panose="020B0604020202020204" pitchFamily="34" charset="0"/>
+                <a:cs typeface="Arial" panose="020B0604020202020204" pitchFamily="34" charset="0"/>
+              </a:rPr>
+              <a:t>phỏng</a:t>
+            </a:r>
+            <a:r>
+              <a:rPr lang="en-US" sz="2400" dirty="0" smtClean="0">
+                <a:latin typeface="Arial" panose="020B0604020202020204" pitchFamily="34" charset="0"/>
+                <a:cs typeface="Arial" panose="020B0604020202020204" pitchFamily="34" charset="0"/>
+              </a:rPr>
+              <a:t> </a:t>
+            </a:r>
+            <a:r>
+              <a:rPr lang="en-US" sz="2400" dirty="0" err="1" smtClean="0">
+                <a:latin typeface="Arial" panose="020B0604020202020204" pitchFamily="34" charset="0"/>
+                <a:cs typeface="Arial" panose="020B0604020202020204" pitchFamily="34" charset="0"/>
+              </a:rPr>
+              <a:t>vấn</a:t>
+            </a:r>
+            <a:r>
+              <a:rPr lang="en-US" sz="2400" dirty="0" smtClean="0">
+                <a:latin typeface="Arial" panose="020B0604020202020204" pitchFamily="34" charset="0"/>
+                <a:cs typeface="Arial" panose="020B0604020202020204" pitchFamily="34" charset="0"/>
+              </a:rPr>
+              <a:t> :</a:t>
+            </a:r>
+          </a:p>
+          <a:p>
             <a:pPr marL="0" indent="0">
               <a:buNone/>
             </a:pPr>
             <a:r>
+              <a:rPr lang="en-US" sz="2400" dirty="0"/>
+              <a:t> </a:t>
+            </a:r>
+            <a:r>
               <a:rPr lang="en-US" sz="2400" dirty="0" smtClean="0"/>
-              <a:t>1. </a:t>
-            </a:r>
-            <a:r>
-              <a:rPr lang="en-US" sz="2400" dirty="0" err="1" smtClean="0"/>
-              <a:t>Kịch</a:t>
-            </a:r>
-            <a:r>
-              <a:rPr lang="en-US" sz="2400" dirty="0" smtClean="0"/>
-              <a:t> </a:t>
-            </a:r>
-            <a:r>
-              <a:rPr lang="en-US" sz="2400" dirty="0" err="1" smtClean="0"/>
-              <a:t>bản</a:t>
-            </a:r>
-            <a:r>
-              <a:rPr lang="en-US" sz="2400" dirty="0"/>
-              <a:t> </a:t>
-            </a:r>
-            <a:r>
-              <a:rPr lang="en-US" sz="2400" dirty="0" smtClean="0"/>
-              <a:t>(</a:t>
-            </a:r>
-            <a:r>
-              <a:rPr lang="en-US" sz="2400" dirty="0" err="1" smtClean="0"/>
-              <a:t>Cảnh</a:t>
-            </a:r>
-            <a:r>
-              <a:rPr lang="en-US" sz="2400" dirty="0" smtClean="0"/>
-              <a:t> quay, </a:t>
-            </a:r>
-            <a:r>
-              <a:rPr lang="en-US" sz="2400" dirty="0" err="1" smtClean="0"/>
-              <a:t>Người</a:t>
-            </a:r>
-            <a:r>
-              <a:rPr lang="en-US" sz="2400" dirty="0" smtClean="0"/>
-              <a:t> </a:t>
-            </a:r>
-            <a:r>
-              <a:rPr lang="en-US" sz="2400" dirty="0" err="1" smtClean="0"/>
-              <a:t>đc</a:t>
-            </a:r>
-            <a:r>
-              <a:rPr lang="en-US" sz="2400" dirty="0" smtClean="0"/>
-              <a:t> </a:t>
-            </a:r>
-            <a:r>
-              <a:rPr lang="en-US" sz="2400" dirty="0" err="1" smtClean="0"/>
-              <a:t>phỏng</a:t>
-            </a:r>
-            <a:r>
-              <a:rPr lang="en-US" sz="2400" dirty="0" smtClean="0"/>
-              <a:t> </a:t>
-            </a:r>
-            <a:r>
-              <a:rPr lang="en-US" sz="2400" dirty="0" err="1" smtClean="0"/>
-              <a:t>vấn</a:t>
-            </a:r>
-            <a:r>
-              <a:rPr lang="en-US" sz="2400" dirty="0" smtClean="0"/>
-              <a:t>, </a:t>
-            </a:r>
-            <a:r>
-              <a:rPr lang="en-US" sz="2400" dirty="0" err="1" smtClean="0"/>
-              <a:t>nội</a:t>
-            </a:r>
-            <a:r>
-              <a:rPr lang="en-US" sz="2400" dirty="0" smtClean="0"/>
-              <a:t> dung </a:t>
-            </a:r>
-            <a:r>
-              <a:rPr lang="en-US" sz="2400" dirty="0" err="1" smtClean="0"/>
-              <a:t>phỏng</a:t>
-            </a:r>
-            <a:r>
-              <a:rPr lang="en-US" sz="2400" dirty="0" smtClean="0"/>
-              <a:t> </a:t>
-            </a:r>
-            <a:r>
-              <a:rPr lang="en-US" sz="2400" dirty="0" err="1" smtClean="0"/>
-              <a:t>vấn</a:t>
-            </a:r>
-            <a:r>
-              <a:rPr lang="en-US" sz="2400" dirty="0" smtClean="0"/>
-              <a:t>)</a:t>
-            </a:r>
-            <a:endParaRPr lang="en-US" sz="2400" dirty="0"/>
+              <a:t>  - </a:t>
+            </a:r>
+            <a:r>
+              <a:rPr lang="en-US" sz="2400" dirty="0" err="1" smtClean="0">
+                <a:latin typeface="Arial" panose="020B0604020202020204" pitchFamily="34" charset="0"/>
+                <a:cs typeface="Arial" panose="020B0604020202020204" pitchFamily="34" charset="0"/>
+              </a:rPr>
+              <a:t>Họ</a:t>
+            </a:r>
+            <a:r>
+              <a:rPr lang="en-US" sz="2400" dirty="0" smtClean="0">
+                <a:latin typeface="Arial" panose="020B0604020202020204" pitchFamily="34" charset="0"/>
+                <a:cs typeface="Arial" panose="020B0604020202020204" pitchFamily="34" charset="0"/>
+              </a:rPr>
+              <a:t> </a:t>
+            </a:r>
+            <a:r>
+              <a:rPr lang="en-US" sz="2400" dirty="0" err="1" smtClean="0">
+                <a:latin typeface="Arial" panose="020B0604020202020204" pitchFamily="34" charset="0"/>
+                <a:cs typeface="Arial" panose="020B0604020202020204" pitchFamily="34" charset="0"/>
+              </a:rPr>
+              <a:t>và</a:t>
+            </a:r>
+            <a:r>
+              <a:rPr lang="en-US" sz="2400" dirty="0" smtClean="0">
+                <a:latin typeface="Arial" panose="020B0604020202020204" pitchFamily="34" charset="0"/>
+                <a:cs typeface="Arial" panose="020B0604020202020204" pitchFamily="34" charset="0"/>
+              </a:rPr>
+              <a:t> </a:t>
+            </a:r>
+            <a:r>
+              <a:rPr lang="en-US" sz="2400" dirty="0" err="1" smtClean="0">
+                <a:latin typeface="Arial" panose="020B0604020202020204" pitchFamily="34" charset="0"/>
+                <a:cs typeface="Arial" panose="020B0604020202020204" pitchFamily="34" charset="0"/>
+              </a:rPr>
+              <a:t>tên</a:t>
+            </a:r>
+            <a:r>
+              <a:rPr lang="en-US" sz="2400" dirty="0" smtClean="0">
+                <a:latin typeface="Arial" panose="020B0604020202020204" pitchFamily="34" charset="0"/>
+                <a:cs typeface="Arial" panose="020B0604020202020204" pitchFamily="34" charset="0"/>
+              </a:rPr>
+              <a:t> : </a:t>
+            </a:r>
+            <a:r>
+              <a:rPr lang="en-US" sz="2400" dirty="0" err="1" smtClean="0">
+                <a:latin typeface="Arial" panose="020B0604020202020204" pitchFamily="34" charset="0"/>
+                <a:cs typeface="Arial" panose="020B0604020202020204" pitchFamily="34" charset="0"/>
+              </a:rPr>
+              <a:t>Nguyễn</a:t>
+            </a:r>
+            <a:r>
+              <a:rPr lang="en-US" sz="2400" dirty="0" smtClean="0">
+                <a:latin typeface="Arial" panose="020B0604020202020204" pitchFamily="34" charset="0"/>
+                <a:cs typeface="Arial" panose="020B0604020202020204" pitchFamily="34" charset="0"/>
+              </a:rPr>
+              <a:t> </a:t>
+            </a:r>
+            <a:r>
+              <a:rPr lang="en-US" sz="2400" dirty="0" err="1" smtClean="0">
+                <a:latin typeface="Arial" panose="020B0604020202020204" pitchFamily="34" charset="0"/>
+                <a:cs typeface="Arial" panose="020B0604020202020204" pitchFamily="34" charset="0"/>
+              </a:rPr>
+              <a:t>Thanh</a:t>
+            </a:r>
+            <a:r>
+              <a:rPr lang="en-US" sz="2400" dirty="0" smtClean="0">
+                <a:latin typeface="Arial" panose="020B0604020202020204" pitchFamily="34" charset="0"/>
+                <a:cs typeface="Arial" panose="020B0604020202020204" pitchFamily="34" charset="0"/>
+              </a:rPr>
+              <a:t> </a:t>
+            </a:r>
+            <a:r>
+              <a:rPr lang="en-US" sz="2400" dirty="0" err="1" smtClean="0">
+                <a:latin typeface="Arial" panose="020B0604020202020204" pitchFamily="34" charset="0"/>
+                <a:cs typeface="Arial" panose="020B0604020202020204" pitchFamily="34" charset="0"/>
+              </a:rPr>
+              <a:t>Danh</a:t>
+            </a:r>
+            <a:r>
+              <a:rPr lang="en-US" sz="2400" dirty="0" smtClean="0">
+                <a:latin typeface="Arial" panose="020B0604020202020204" pitchFamily="34" charset="0"/>
+                <a:cs typeface="Arial" panose="020B0604020202020204" pitchFamily="34" charset="0"/>
+              </a:rPr>
+              <a:t> – Leader </a:t>
+            </a:r>
+            <a:r>
+              <a:rPr lang="en-US" sz="2400" dirty="0" err="1" smtClean="0">
+                <a:latin typeface="Arial" panose="020B0604020202020204" pitchFamily="34" charset="0"/>
+                <a:cs typeface="Arial" panose="020B0604020202020204" pitchFamily="34" charset="0"/>
+              </a:rPr>
+              <a:t>thiết</a:t>
+            </a:r>
+            <a:r>
+              <a:rPr lang="en-US" sz="2400" dirty="0" smtClean="0">
+                <a:latin typeface="Arial" panose="020B0604020202020204" pitchFamily="34" charset="0"/>
+                <a:cs typeface="Arial" panose="020B0604020202020204" pitchFamily="34" charset="0"/>
+              </a:rPr>
+              <a:t> </a:t>
+            </a:r>
+            <a:r>
+              <a:rPr lang="en-US" sz="2400" dirty="0" err="1" smtClean="0">
+                <a:latin typeface="Arial" panose="020B0604020202020204" pitchFamily="34" charset="0"/>
+                <a:cs typeface="Arial" panose="020B0604020202020204" pitchFamily="34" charset="0"/>
+              </a:rPr>
+              <a:t>kế</a:t>
+            </a:r>
+            <a:r>
+              <a:rPr lang="en-US" sz="2400" dirty="0" smtClean="0">
+                <a:latin typeface="Arial" panose="020B0604020202020204" pitchFamily="34" charset="0"/>
+                <a:cs typeface="Arial" panose="020B0604020202020204" pitchFamily="34" charset="0"/>
+              </a:rPr>
+              <a:t> </a:t>
+            </a:r>
+            <a:r>
+              <a:rPr lang="en-US" sz="2400" dirty="0" err="1" smtClean="0">
+                <a:latin typeface="Arial" panose="020B0604020202020204" pitchFamily="34" charset="0"/>
+                <a:cs typeface="Arial" panose="020B0604020202020204" pitchFamily="34" charset="0"/>
+              </a:rPr>
+              <a:t>dự</a:t>
+            </a:r>
+            <a:r>
+              <a:rPr lang="en-US" sz="2400" dirty="0" smtClean="0">
+                <a:latin typeface="Arial" panose="020B0604020202020204" pitchFamily="34" charset="0"/>
+                <a:cs typeface="Arial" panose="020B0604020202020204" pitchFamily="34" charset="0"/>
+              </a:rPr>
+              <a:t> </a:t>
+            </a:r>
+            <a:r>
+              <a:rPr lang="en-US" sz="2400" dirty="0" err="1" smtClean="0">
+                <a:latin typeface="Arial" panose="020B0604020202020204" pitchFamily="34" charset="0"/>
+                <a:cs typeface="Arial" panose="020B0604020202020204" pitchFamily="34" charset="0"/>
+              </a:rPr>
+              <a:t>án</a:t>
+            </a:r>
+            <a:r>
+              <a:rPr lang="en-US" sz="2400" dirty="0" smtClean="0">
+                <a:latin typeface="Arial" panose="020B0604020202020204" pitchFamily="34" charset="0"/>
+                <a:cs typeface="Arial" panose="020B0604020202020204" pitchFamily="34" charset="0"/>
+              </a:rPr>
+              <a:t> </a:t>
+            </a:r>
+            <a:r>
+              <a:rPr lang="en-US" sz="2400" dirty="0" err="1" smtClean="0">
+                <a:latin typeface="Arial" panose="020B0604020202020204" pitchFamily="34" charset="0"/>
+                <a:cs typeface="Arial" panose="020B0604020202020204" pitchFamily="34" charset="0"/>
+              </a:rPr>
+              <a:t>phòng</a:t>
+            </a:r>
+            <a:r>
+              <a:rPr lang="en-US" sz="2400" dirty="0" smtClean="0">
+                <a:latin typeface="Arial" panose="020B0604020202020204" pitchFamily="34" charset="0"/>
+                <a:cs typeface="Arial" panose="020B0604020202020204" pitchFamily="34" charset="0"/>
+              </a:rPr>
+              <a:t> 2</a:t>
+            </a:r>
+          </a:p>
+          <a:p>
+            <a:pPr marL="0" indent="0">
+              <a:buNone/>
+            </a:pPr>
+            <a:r>
+              <a:rPr lang="en-US" sz="2400" dirty="0">
+                <a:latin typeface="Arial" panose="020B0604020202020204" pitchFamily="34" charset="0"/>
+                <a:cs typeface="Arial" panose="020B0604020202020204" pitchFamily="34" charset="0"/>
+              </a:rPr>
+              <a:t> </a:t>
+            </a:r>
+            <a:r>
+              <a:rPr lang="en-US" sz="2400" dirty="0" smtClean="0">
+                <a:latin typeface="Arial" panose="020B0604020202020204" pitchFamily="34" charset="0"/>
+                <a:cs typeface="Arial" panose="020B0604020202020204" pitchFamily="34" charset="0"/>
+              </a:rPr>
+              <a:t>  - </a:t>
+            </a:r>
+            <a:r>
+              <a:rPr lang="en-US" sz="2400" dirty="0" err="1" smtClean="0">
+                <a:latin typeface="Arial" panose="020B0604020202020204" pitchFamily="34" charset="0"/>
+                <a:cs typeface="Arial" panose="020B0604020202020204" pitchFamily="34" charset="0"/>
+              </a:rPr>
+              <a:t>Họ</a:t>
+            </a:r>
+            <a:r>
+              <a:rPr lang="en-US" sz="2400" dirty="0" smtClean="0">
+                <a:latin typeface="Arial" panose="020B0604020202020204" pitchFamily="34" charset="0"/>
+                <a:cs typeface="Arial" panose="020B0604020202020204" pitchFamily="34" charset="0"/>
+              </a:rPr>
+              <a:t> </a:t>
+            </a:r>
+            <a:r>
+              <a:rPr lang="en-US" sz="2400" dirty="0" err="1" smtClean="0">
+                <a:latin typeface="Arial" panose="020B0604020202020204" pitchFamily="34" charset="0"/>
+                <a:cs typeface="Arial" panose="020B0604020202020204" pitchFamily="34" charset="0"/>
+              </a:rPr>
+              <a:t>và</a:t>
+            </a:r>
+            <a:r>
+              <a:rPr lang="en-US" sz="2400" dirty="0" smtClean="0">
+                <a:latin typeface="Arial" panose="020B0604020202020204" pitchFamily="34" charset="0"/>
+                <a:cs typeface="Arial" panose="020B0604020202020204" pitchFamily="34" charset="0"/>
+              </a:rPr>
+              <a:t> </a:t>
+            </a:r>
+            <a:r>
+              <a:rPr lang="en-US" sz="2400" dirty="0" err="1" smtClean="0">
+                <a:latin typeface="Arial" panose="020B0604020202020204" pitchFamily="34" charset="0"/>
+                <a:cs typeface="Arial" panose="020B0604020202020204" pitchFamily="34" charset="0"/>
+              </a:rPr>
+              <a:t>tên</a:t>
+            </a:r>
+            <a:r>
+              <a:rPr lang="en-US" sz="2400" dirty="0" smtClean="0">
+                <a:latin typeface="Arial" panose="020B0604020202020204" pitchFamily="34" charset="0"/>
+                <a:cs typeface="Arial" panose="020B0604020202020204" pitchFamily="34" charset="0"/>
+              </a:rPr>
+              <a:t> : </a:t>
+            </a:r>
+            <a:r>
+              <a:rPr lang="en-US" sz="2400" dirty="0" err="1" smtClean="0">
+                <a:latin typeface="Arial" panose="020B0604020202020204" pitchFamily="34" charset="0"/>
+                <a:cs typeface="Arial" panose="020B0604020202020204" pitchFamily="34" charset="0"/>
+              </a:rPr>
+              <a:t>Nguyễn</a:t>
+            </a:r>
+            <a:r>
+              <a:rPr lang="en-US" sz="2400" dirty="0" smtClean="0">
+                <a:latin typeface="Arial" panose="020B0604020202020204" pitchFamily="34" charset="0"/>
+                <a:cs typeface="Arial" panose="020B0604020202020204" pitchFamily="34" charset="0"/>
+              </a:rPr>
+              <a:t> </a:t>
+            </a:r>
+            <a:r>
+              <a:rPr lang="en-US" sz="2400" dirty="0" err="1" smtClean="0">
+                <a:latin typeface="Arial" panose="020B0604020202020204" pitchFamily="34" charset="0"/>
+                <a:cs typeface="Arial" panose="020B0604020202020204" pitchFamily="34" charset="0"/>
+              </a:rPr>
+              <a:t>Hoàng</a:t>
+            </a:r>
+            <a:r>
+              <a:rPr lang="en-US" sz="2400" dirty="0" smtClean="0">
+                <a:latin typeface="Arial" panose="020B0604020202020204" pitchFamily="34" charset="0"/>
+                <a:cs typeface="Arial" panose="020B0604020202020204" pitchFamily="34" charset="0"/>
+              </a:rPr>
+              <a:t> </a:t>
+            </a:r>
+            <a:r>
+              <a:rPr lang="en-US" sz="2400" dirty="0" err="1" smtClean="0">
+                <a:latin typeface="Arial" panose="020B0604020202020204" pitchFamily="34" charset="0"/>
+                <a:cs typeface="Arial" panose="020B0604020202020204" pitchFamily="34" charset="0"/>
+              </a:rPr>
+              <a:t>Việt</a:t>
+            </a:r>
+            <a:r>
+              <a:rPr lang="en-US" sz="2400" dirty="0" smtClean="0">
+                <a:latin typeface="Arial" panose="020B0604020202020204" pitchFamily="34" charset="0"/>
+                <a:cs typeface="Arial" panose="020B0604020202020204" pitchFamily="34" charset="0"/>
+              </a:rPr>
+              <a:t> – Leader </a:t>
+            </a:r>
+            <a:r>
+              <a:rPr lang="en-US" sz="2400" dirty="0" err="1" smtClean="0">
+                <a:latin typeface="Arial" panose="020B0604020202020204" pitchFamily="34" charset="0"/>
+                <a:cs typeface="Arial" panose="020B0604020202020204" pitchFamily="34" charset="0"/>
+              </a:rPr>
+              <a:t>thiết</a:t>
+            </a:r>
+            <a:r>
+              <a:rPr lang="en-US" sz="2400" dirty="0" smtClean="0">
+                <a:latin typeface="Arial" panose="020B0604020202020204" pitchFamily="34" charset="0"/>
+                <a:cs typeface="Arial" panose="020B0604020202020204" pitchFamily="34" charset="0"/>
+              </a:rPr>
+              <a:t> </a:t>
+            </a:r>
+            <a:r>
+              <a:rPr lang="en-US" sz="2400" dirty="0" err="1" smtClean="0">
+                <a:latin typeface="Arial" panose="020B0604020202020204" pitchFamily="34" charset="0"/>
+                <a:cs typeface="Arial" panose="020B0604020202020204" pitchFamily="34" charset="0"/>
+              </a:rPr>
+              <a:t>kế</a:t>
+            </a:r>
+            <a:r>
+              <a:rPr lang="en-US" sz="2400" dirty="0" smtClean="0">
+                <a:latin typeface="Arial" panose="020B0604020202020204" pitchFamily="34" charset="0"/>
+                <a:cs typeface="Arial" panose="020B0604020202020204" pitchFamily="34" charset="0"/>
+              </a:rPr>
+              <a:t> </a:t>
+            </a:r>
+            <a:r>
+              <a:rPr lang="en-US" sz="2400" dirty="0" err="1" smtClean="0">
+                <a:latin typeface="Arial" panose="020B0604020202020204" pitchFamily="34" charset="0"/>
+                <a:cs typeface="Arial" panose="020B0604020202020204" pitchFamily="34" charset="0"/>
+              </a:rPr>
+              <a:t>dự</a:t>
+            </a:r>
+            <a:r>
+              <a:rPr lang="en-US" sz="2400" dirty="0" smtClean="0">
+                <a:latin typeface="Arial" panose="020B0604020202020204" pitchFamily="34" charset="0"/>
+                <a:cs typeface="Arial" panose="020B0604020202020204" pitchFamily="34" charset="0"/>
+              </a:rPr>
+              <a:t> </a:t>
+            </a:r>
+            <a:r>
+              <a:rPr lang="en-US" sz="2400" dirty="0" err="1" smtClean="0">
+                <a:latin typeface="Arial" panose="020B0604020202020204" pitchFamily="34" charset="0"/>
+                <a:cs typeface="Arial" panose="020B0604020202020204" pitchFamily="34" charset="0"/>
+              </a:rPr>
+              <a:t>án</a:t>
+            </a:r>
+            <a:r>
+              <a:rPr lang="en-US" sz="2400" dirty="0" smtClean="0">
+                <a:latin typeface="Arial" panose="020B0604020202020204" pitchFamily="34" charset="0"/>
+                <a:cs typeface="Arial" panose="020B0604020202020204" pitchFamily="34" charset="0"/>
+              </a:rPr>
+              <a:t> </a:t>
+            </a:r>
+            <a:r>
+              <a:rPr lang="en-US" sz="2400" dirty="0" err="1" smtClean="0">
+                <a:latin typeface="Arial" panose="020B0604020202020204" pitchFamily="34" charset="0"/>
+                <a:cs typeface="Arial" panose="020B0604020202020204" pitchFamily="34" charset="0"/>
+              </a:rPr>
+              <a:t>phòng</a:t>
+            </a:r>
+            <a:r>
+              <a:rPr lang="en-US" sz="2400" dirty="0" smtClean="0">
+                <a:latin typeface="Arial" panose="020B0604020202020204" pitchFamily="34" charset="0"/>
+                <a:cs typeface="Arial" panose="020B0604020202020204" pitchFamily="34" charset="0"/>
+              </a:rPr>
+              <a:t> 2</a:t>
+            </a:r>
+          </a:p>
+          <a:p>
+            <a:pPr marL="0" indent="0">
+              <a:buNone/>
+            </a:pPr>
+            <a:r>
+              <a:rPr lang="en-US" sz="2400" dirty="0">
+                <a:latin typeface="Arial" panose="020B0604020202020204" pitchFamily="34" charset="0"/>
+                <a:cs typeface="Arial" panose="020B0604020202020204" pitchFamily="34" charset="0"/>
+              </a:rPr>
+              <a:t> </a:t>
+            </a:r>
+            <a:r>
+              <a:rPr lang="en-US" sz="2400" dirty="0" smtClean="0">
+                <a:latin typeface="Arial" panose="020B0604020202020204" pitchFamily="34" charset="0"/>
+                <a:cs typeface="Arial" panose="020B0604020202020204" pitchFamily="34" charset="0"/>
+              </a:rPr>
+              <a:t>  </a:t>
+            </a:r>
+            <a:endParaRPr lang="en-US" sz="2400" dirty="0" smtClean="0"/>
           </a:p>
         </p:txBody>
       </p:sp>
@@ -11236,10 +11919,1044 @@
         </p:nvSpPr>
         <p:spPr/>
         <p:txBody>
-          <a:bodyPr/>
+          <a:bodyPr>
+            <a:normAutofit/>
+          </a:bodyPr>
           <a:lstStyle/>
           <a:p>
-            <a:endParaRPr lang="en-US"/>
+            <a:pPr>
+              <a:buFont typeface="Arial" panose="020B0604020202020204" pitchFamily="34" charset="0"/>
+              <a:buChar char="•"/>
+            </a:pPr>
+            <a:r>
+              <a:rPr lang="en-US" sz="2400" dirty="0" err="1" smtClean="0">
+                <a:latin typeface="Arial" panose="020B0604020202020204" pitchFamily="34" charset="0"/>
+                <a:cs typeface="Arial" panose="020B0604020202020204" pitchFamily="34" charset="0"/>
+              </a:rPr>
+              <a:t>Anh</a:t>
+            </a:r>
+            <a:r>
+              <a:rPr lang="en-US" sz="2400" dirty="0" smtClean="0">
+                <a:latin typeface="Arial" panose="020B0604020202020204" pitchFamily="34" charset="0"/>
+                <a:cs typeface="Arial" panose="020B0604020202020204" pitchFamily="34" charset="0"/>
+              </a:rPr>
+              <a:t> </a:t>
+            </a:r>
+            <a:r>
+              <a:rPr lang="en-US" sz="2400" dirty="0" err="1" smtClean="0">
+                <a:latin typeface="Arial" panose="020B0604020202020204" pitchFamily="34" charset="0"/>
+                <a:cs typeface="Arial" panose="020B0604020202020204" pitchFamily="34" charset="0"/>
+              </a:rPr>
+              <a:t>đã</a:t>
+            </a:r>
+            <a:r>
+              <a:rPr lang="en-US" sz="2400" dirty="0" smtClean="0">
+                <a:latin typeface="Arial" panose="020B0604020202020204" pitchFamily="34" charset="0"/>
+                <a:cs typeface="Arial" panose="020B0604020202020204" pitchFamily="34" charset="0"/>
+              </a:rPr>
+              <a:t> </a:t>
+            </a:r>
+            <a:r>
+              <a:rPr lang="en-US" sz="2400" dirty="0" err="1" smtClean="0">
+                <a:latin typeface="Arial" panose="020B0604020202020204" pitchFamily="34" charset="0"/>
+                <a:cs typeface="Arial" panose="020B0604020202020204" pitchFamily="34" charset="0"/>
+              </a:rPr>
+              <a:t>từng</a:t>
+            </a:r>
+            <a:r>
+              <a:rPr lang="en-US" sz="2400" dirty="0" smtClean="0">
+                <a:latin typeface="Arial" panose="020B0604020202020204" pitchFamily="34" charset="0"/>
+                <a:cs typeface="Arial" panose="020B0604020202020204" pitchFamily="34" charset="0"/>
+              </a:rPr>
+              <a:t> </a:t>
+            </a:r>
+            <a:r>
+              <a:rPr lang="en-US" sz="2400" dirty="0" err="1" smtClean="0">
+                <a:latin typeface="Arial" panose="020B0604020202020204" pitchFamily="34" charset="0"/>
+                <a:cs typeface="Arial" panose="020B0604020202020204" pitchFamily="34" charset="0"/>
+              </a:rPr>
+              <a:t>học</a:t>
+            </a:r>
+            <a:r>
+              <a:rPr lang="en-US" sz="2400" dirty="0" smtClean="0">
+                <a:latin typeface="Arial" panose="020B0604020202020204" pitchFamily="34" charset="0"/>
+                <a:cs typeface="Arial" panose="020B0604020202020204" pitchFamily="34" charset="0"/>
+              </a:rPr>
+              <a:t> </a:t>
+            </a:r>
+            <a:r>
+              <a:rPr lang="en-US" sz="2400" dirty="0" err="1" smtClean="0">
+                <a:latin typeface="Arial" panose="020B0604020202020204" pitchFamily="34" charset="0"/>
+                <a:cs typeface="Arial" panose="020B0604020202020204" pitchFamily="34" charset="0"/>
+              </a:rPr>
+              <a:t>trường</a:t>
+            </a:r>
+            <a:r>
+              <a:rPr lang="en-US" sz="2400" dirty="0" smtClean="0">
+                <a:latin typeface="Arial" panose="020B0604020202020204" pitchFamily="34" charset="0"/>
+                <a:cs typeface="Arial" panose="020B0604020202020204" pitchFamily="34" charset="0"/>
+              </a:rPr>
+              <a:t> </a:t>
+            </a:r>
+            <a:r>
+              <a:rPr lang="en-US" sz="2400" dirty="0" err="1" smtClean="0">
+                <a:latin typeface="Arial" panose="020B0604020202020204" pitchFamily="34" charset="0"/>
+                <a:cs typeface="Arial" panose="020B0604020202020204" pitchFamily="34" charset="0"/>
+              </a:rPr>
+              <a:t>nào</a:t>
+            </a:r>
+            <a:r>
+              <a:rPr lang="en-US" sz="2400" dirty="0" smtClean="0">
+                <a:latin typeface="Arial" panose="020B0604020202020204" pitchFamily="34" charset="0"/>
+                <a:cs typeface="Arial" panose="020B0604020202020204" pitchFamily="34" charset="0"/>
+              </a:rPr>
+              <a:t> ?</a:t>
+            </a:r>
+          </a:p>
+          <a:p>
+            <a:pPr>
+              <a:buFont typeface="Arial" panose="020B0604020202020204" pitchFamily="34" charset="0"/>
+              <a:buChar char="•"/>
+            </a:pPr>
+            <a:r>
+              <a:rPr lang="en-US" sz="2400" dirty="0" err="1" smtClean="0">
+                <a:latin typeface="Arial" panose="020B0604020202020204" pitchFamily="34" charset="0"/>
+                <a:cs typeface="Arial" panose="020B0604020202020204" pitchFamily="34" charset="0"/>
+              </a:rPr>
+              <a:t>Trong</a:t>
+            </a:r>
+            <a:r>
+              <a:rPr lang="en-US" sz="2400" dirty="0" smtClean="0">
+                <a:latin typeface="Arial" panose="020B0604020202020204" pitchFamily="34" charset="0"/>
+                <a:cs typeface="Arial" panose="020B0604020202020204" pitchFamily="34" charset="0"/>
+              </a:rPr>
+              <a:t> </a:t>
+            </a:r>
+            <a:r>
+              <a:rPr lang="en-US" sz="2400" dirty="0" err="1" smtClean="0">
+                <a:latin typeface="Arial" panose="020B0604020202020204" pitchFamily="34" charset="0"/>
+                <a:cs typeface="Arial" panose="020B0604020202020204" pitchFamily="34" charset="0"/>
+              </a:rPr>
+              <a:t>quá</a:t>
+            </a:r>
+            <a:r>
+              <a:rPr lang="en-US" sz="2400" dirty="0" smtClean="0">
+                <a:latin typeface="Arial" panose="020B0604020202020204" pitchFamily="34" charset="0"/>
+                <a:cs typeface="Arial" panose="020B0604020202020204" pitchFamily="34" charset="0"/>
+              </a:rPr>
+              <a:t> </a:t>
+            </a:r>
+            <a:r>
+              <a:rPr lang="en-US" sz="2400" dirty="0" err="1" smtClean="0">
+                <a:latin typeface="Arial" panose="020B0604020202020204" pitchFamily="34" charset="0"/>
+                <a:cs typeface="Arial" panose="020B0604020202020204" pitchFamily="34" charset="0"/>
+              </a:rPr>
+              <a:t>trình</a:t>
+            </a:r>
+            <a:r>
+              <a:rPr lang="en-US" sz="2400" dirty="0" smtClean="0">
+                <a:latin typeface="Arial" panose="020B0604020202020204" pitchFamily="34" charset="0"/>
+                <a:cs typeface="Arial" panose="020B0604020202020204" pitchFamily="34" charset="0"/>
+              </a:rPr>
+              <a:t> </a:t>
+            </a:r>
+            <a:r>
+              <a:rPr lang="en-US" sz="2400" dirty="0" err="1" smtClean="0">
+                <a:latin typeface="Arial" panose="020B0604020202020204" pitchFamily="34" charset="0"/>
+                <a:cs typeface="Arial" panose="020B0604020202020204" pitchFamily="34" charset="0"/>
+              </a:rPr>
+              <a:t>học</a:t>
+            </a:r>
+            <a:r>
+              <a:rPr lang="en-US" sz="2400" dirty="0" smtClean="0">
+                <a:latin typeface="Arial" panose="020B0604020202020204" pitchFamily="34" charset="0"/>
+                <a:cs typeface="Arial" panose="020B0604020202020204" pitchFamily="34" charset="0"/>
+              </a:rPr>
+              <a:t> </a:t>
+            </a:r>
+            <a:r>
+              <a:rPr lang="en-US" sz="2400" dirty="0" err="1" smtClean="0">
+                <a:latin typeface="Arial" panose="020B0604020202020204" pitchFamily="34" charset="0"/>
+                <a:cs typeface="Arial" panose="020B0604020202020204" pitchFamily="34" charset="0"/>
+              </a:rPr>
+              <a:t>tập</a:t>
+            </a:r>
+            <a:r>
+              <a:rPr lang="en-US" sz="2400" dirty="0" smtClean="0">
+                <a:latin typeface="Arial" panose="020B0604020202020204" pitchFamily="34" charset="0"/>
+                <a:cs typeface="Arial" panose="020B0604020202020204" pitchFamily="34" charset="0"/>
+              </a:rPr>
+              <a:t> </a:t>
+            </a:r>
+            <a:r>
+              <a:rPr lang="en-US" sz="2400" dirty="0" err="1" smtClean="0">
+                <a:latin typeface="Arial" panose="020B0604020202020204" pitchFamily="34" charset="0"/>
+                <a:cs typeface="Arial" panose="020B0604020202020204" pitchFamily="34" charset="0"/>
+              </a:rPr>
+              <a:t>anh</a:t>
+            </a:r>
+            <a:r>
+              <a:rPr lang="en-US" sz="2400" dirty="0" smtClean="0">
+                <a:latin typeface="Arial" panose="020B0604020202020204" pitchFamily="34" charset="0"/>
+                <a:cs typeface="Arial" panose="020B0604020202020204" pitchFamily="34" charset="0"/>
+              </a:rPr>
+              <a:t> </a:t>
+            </a:r>
+            <a:r>
+              <a:rPr lang="en-US" sz="2400" dirty="0" err="1" smtClean="0">
+                <a:latin typeface="Arial" panose="020B0604020202020204" pitchFamily="34" charset="0"/>
+                <a:cs typeface="Arial" panose="020B0604020202020204" pitchFamily="34" charset="0"/>
+              </a:rPr>
+              <a:t>đã</a:t>
+            </a:r>
+            <a:r>
+              <a:rPr lang="en-US" sz="2400" dirty="0" smtClean="0">
+                <a:latin typeface="Arial" panose="020B0604020202020204" pitchFamily="34" charset="0"/>
+                <a:cs typeface="Arial" panose="020B0604020202020204" pitchFamily="34" charset="0"/>
+              </a:rPr>
+              <a:t> </a:t>
+            </a:r>
+            <a:r>
+              <a:rPr lang="en-US" sz="2400" dirty="0" err="1" smtClean="0">
+                <a:latin typeface="Arial" panose="020B0604020202020204" pitchFamily="34" charset="0"/>
+                <a:cs typeface="Arial" panose="020B0604020202020204" pitchFamily="34" charset="0"/>
+              </a:rPr>
+              <a:t>gặp</a:t>
+            </a:r>
+            <a:r>
+              <a:rPr lang="en-US" sz="2400" dirty="0" smtClean="0">
+                <a:latin typeface="Arial" panose="020B0604020202020204" pitchFamily="34" charset="0"/>
+                <a:cs typeface="Arial" panose="020B0604020202020204" pitchFamily="34" charset="0"/>
+              </a:rPr>
+              <a:t> </a:t>
+            </a:r>
+            <a:r>
+              <a:rPr lang="en-US" sz="2400" dirty="0" err="1" smtClean="0">
+                <a:latin typeface="Arial" panose="020B0604020202020204" pitchFamily="34" charset="0"/>
+                <a:cs typeface="Arial" panose="020B0604020202020204" pitchFamily="34" charset="0"/>
+              </a:rPr>
+              <a:t>những</a:t>
+            </a:r>
+            <a:r>
+              <a:rPr lang="en-US" sz="2400" dirty="0" smtClean="0">
+                <a:latin typeface="Arial" panose="020B0604020202020204" pitchFamily="34" charset="0"/>
+                <a:cs typeface="Arial" panose="020B0604020202020204" pitchFamily="34" charset="0"/>
+              </a:rPr>
+              <a:t> </a:t>
+            </a:r>
+            <a:r>
+              <a:rPr lang="en-US" sz="2400" dirty="0" err="1" smtClean="0">
+                <a:latin typeface="Arial" panose="020B0604020202020204" pitchFamily="34" charset="0"/>
+                <a:cs typeface="Arial" panose="020B0604020202020204" pitchFamily="34" charset="0"/>
+              </a:rPr>
+              <a:t>khó</a:t>
+            </a:r>
+            <a:r>
+              <a:rPr lang="en-US" sz="2400" dirty="0" smtClean="0">
+                <a:latin typeface="Arial" panose="020B0604020202020204" pitchFamily="34" charset="0"/>
+                <a:cs typeface="Arial" panose="020B0604020202020204" pitchFamily="34" charset="0"/>
+              </a:rPr>
+              <a:t> </a:t>
+            </a:r>
+            <a:r>
+              <a:rPr lang="en-US" sz="2400" dirty="0" err="1" smtClean="0">
+                <a:latin typeface="Arial" panose="020B0604020202020204" pitchFamily="34" charset="0"/>
+                <a:cs typeface="Arial" panose="020B0604020202020204" pitchFamily="34" charset="0"/>
+              </a:rPr>
+              <a:t>khăn</a:t>
+            </a:r>
+            <a:r>
+              <a:rPr lang="en-US" sz="2400" dirty="0" smtClean="0">
+                <a:latin typeface="Arial" panose="020B0604020202020204" pitchFamily="34" charset="0"/>
+                <a:cs typeface="Arial" panose="020B0604020202020204" pitchFamily="34" charset="0"/>
+              </a:rPr>
+              <a:t> </a:t>
+            </a:r>
+            <a:r>
+              <a:rPr lang="en-US" sz="2400" dirty="0" err="1" smtClean="0">
+                <a:latin typeface="Arial" panose="020B0604020202020204" pitchFamily="34" charset="0"/>
+                <a:cs typeface="Arial" panose="020B0604020202020204" pitchFamily="34" charset="0"/>
+              </a:rPr>
+              <a:t>gì</a:t>
+            </a:r>
+            <a:r>
+              <a:rPr lang="en-US" sz="2400" dirty="0" smtClean="0">
+                <a:latin typeface="Arial" panose="020B0604020202020204" pitchFamily="34" charset="0"/>
+                <a:cs typeface="Arial" panose="020B0604020202020204" pitchFamily="34" charset="0"/>
+              </a:rPr>
+              <a:t> ?</a:t>
+            </a:r>
+          </a:p>
+          <a:p>
+            <a:pPr>
+              <a:buFont typeface="Arial" panose="020B0604020202020204" pitchFamily="34" charset="0"/>
+              <a:buChar char="•"/>
+            </a:pPr>
+            <a:r>
+              <a:rPr lang="en-US" sz="2400" dirty="0" err="1" smtClean="0">
+                <a:latin typeface="Arial" panose="020B0604020202020204" pitchFamily="34" charset="0"/>
+                <a:cs typeface="Arial" panose="020B0604020202020204" pitchFamily="34" charset="0"/>
+              </a:rPr>
+              <a:t>Khi</a:t>
+            </a:r>
+            <a:r>
+              <a:rPr lang="en-US" sz="2400" dirty="0" smtClean="0">
+                <a:latin typeface="Arial" panose="020B0604020202020204" pitchFamily="34" charset="0"/>
+                <a:cs typeface="Arial" panose="020B0604020202020204" pitchFamily="34" charset="0"/>
+              </a:rPr>
+              <a:t> </a:t>
+            </a:r>
+            <a:r>
+              <a:rPr lang="en-US" sz="2400" dirty="0" err="1" smtClean="0">
+                <a:latin typeface="Arial" panose="020B0604020202020204" pitchFamily="34" charset="0"/>
+                <a:cs typeface="Arial" panose="020B0604020202020204" pitchFamily="34" charset="0"/>
+              </a:rPr>
+              <a:t>đi</a:t>
+            </a:r>
+            <a:r>
+              <a:rPr lang="en-US" sz="2400" dirty="0" smtClean="0">
+                <a:latin typeface="Arial" panose="020B0604020202020204" pitchFamily="34" charset="0"/>
+                <a:cs typeface="Arial" panose="020B0604020202020204" pitchFamily="34" charset="0"/>
+              </a:rPr>
+              <a:t> </a:t>
+            </a:r>
+            <a:r>
+              <a:rPr lang="en-US" sz="2400" dirty="0" err="1" smtClean="0">
+                <a:latin typeface="Arial" panose="020B0604020202020204" pitchFamily="34" charset="0"/>
+                <a:cs typeface="Arial" panose="020B0604020202020204" pitchFamily="34" charset="0"/>
+              </a:rPr>
+              <a:t>thực</a:t>
+            </a:r>
+            <a:r>
+              <a:rPr lang="en-US" sz="2400" dirty="0" smtClean="0">
+                <a:latin typeface="Arial" panose="020B0604020202020204" pitchFamily="34" charset="0"/>
+                <a:cs typeface="Arial" panose="020B0604020202020204" pitchFamily="34" charset="0"/>
+              </a:rPr>
+              <a:t> </a:t>
+            </a:r>
+            <a:r>
+              <a:rPr lang="en-US" sz="2400" dirty="0" err="1" smtClean="0">
+                <a:latin typeface="Arial" panose="020B0604020202020204" pitchFamily="34" charset="0"/>
+                <a:cs typeface="Arial" panose="020B0604020202020204" pitchFamily="34" charset="0"/>
+              </a:rPr>
+              <a:t>tập</a:t>
+            </a:r>
+            <a:r>
+              <a:rPr lang="en-US" sz="2400" dirty="0" smtClean="0">
+                <a:latin typeface="Arial" panose="020B0604020202020204" pitchFamily="34" charset="0"/>
+                <a:cs typeface="Arial" panose="020B0604020202020204" pitchFamily="34" charset="0"/>
+              </a:rPr>
+              <a:t> </a:t>
+            </a:r>
+            <a:r>
+              <a:rPr lang="en-US" sz="2400" dirty="0" err="1" smtClean="0">
+                <a:latin typeface="Arial" panose="020B0604020202020204" pitchFamily="34" charset="0"/>
+                <a:cs typeface="Arial" panose="020B0604020202020204" pitchFamily="34" charset="0"/>
+              </a:rPr>
+              <a:t>thì</a:t>
+            </a:r>
+            <a:r>
+              <a:rPr lang="en-US" sz="2400" dirty="0" smtClean="0">
+                <a:latin typeface="Arial" panose="020B0604020202020204" pitchFamily="34" charset="0"/>
+                <a:cs typeface="Arial" panose="020B0604020202020204" pitchFamily="34" charset="0"/>
+              </a:rPr>
+              <a:t> </a:t>
+            </a:r>
+            <a:r>
+              <a:rPr lang="en-US" sz="2400" dirty="0" err="1" smtClean="0">
+                <a:latin typeface="Arial" panose="020B0604020202020204" pitchFamily="34" charset="0"/>
+                <a:cs typeface="Arial" panose="020B0604020202020204" pitchFamily="34" charset="0"/>
+              </a:rPr>
+              <a:t>anh</a:t>
+            </a:r>
+            <a:r>
+              <a:rPr lang="en-US" sz="2400" dirty="0" smtClean="0">
+                <a:latin typeface="Arial" panose="020B0604020202020204" pitchFamily="34" charset="0"/>
+                <a:cs typeface="Arial" panose="020B0604020202020204" pitchFamily="34" charset="0"/>
+              </a:rPr>
+              <a:t> </a:t>
+            </a:r>
+            <a:r>
+              <a:rPr lang="en-US" sz="2400" dirty="0" err="1" smtClean="0">
+                <a:latin typeface="Arial" panose="020B0604020202020204" pitchFamily="34" charset="0"/>
+                <a:cs typeface="Arial" panose="020B0604020202020204" pitchFamily="34" charset="0"/>
+              </a:rPr>
+              <a:t>có</a:t>
+            </a:r>
+            <a:r>
+              <a:rPr lang="en-US" sz="2400" dirty="0" smtClean="0">
+                <a:latin typeface="Arial" panose="020B0604020202020204" pitchFamily="34" charset="0"/>
+                <a:cs typeface="Arial" panose="020B0604020202020204" pitchFamily="34" charset="0"/>
+              </a:rPr>
+              <a:t> </a:t>
+            </a:r>
+            <a:r>
+              <a:rPr lang="en-US" sz="2400" dirty="0" err="1" smtClean="0">
+                <a:latin typeface="Arial" panose="020B0604020202020204" pitchFamily="34" charset="0"/>
+                <a:cs typeface="Arial" panose="020B0604020202020204" pitchFamily="34" charset="0"/>
+              </a:rPr>
+              <a:t>cảm</a:t>
+            </a:r>
+            <a:r>
+              <a:rPr lang="en-US" sz="2400" dirty="0" smtClean="0">
+                <a:latin typeface="Arial" panose="020B0604020202020204" pitchFamily="34" charset="0"/>
+                <a:cs typeface="Arial" panose="020B0604020202020204" pitchFamily="34" charset="0"/>
+              </a:rPr>
+              <a:t> </a:t>
+            </a:r>
+            <a:r>
+              <a:rPr lang="en-US" sz="2400" dirty="0" err="1" smtClean="0">
+                <a:latin typeface="Arial" panose="020B0604020202020204" pitchFamily="34" charset="0"/>
+                <a:cs typeface="Arial" panose="020B0604020202020204" pitchFamily="34" charset="0"/>
+              </a:rPr>
+              <a:t>thấy</a:t>
+            </a:r>
+            <a:r>
+              <a:rPr lang="en-US" sz="2400" dirty="0" smtClean="0">
+                <a:latin typeface="Arial" panose="020B0604020202020204" pitchFamily="34" charset="0"/>
+                <a:cs typeface="Arial" panose="020B0604020202020204" pitchFamily="34" charset="0"/>
+              </a:rPr>
+              <a:t> </a:t>
+            </a:r>
+            <a:r>
+              <a:rPr lang="en-US" sz="2400" dirty="0" err="1" smtClean="0">
+                <a:latin typeface="Arial" panose="020B0604020202020204" pitchFamily="34" charset="0"/>
+                <a:cs typeface="Arial" panose="020B0604020202020204" pitchFamily="34" charset="0"/>
+              </a:rPr>
+              <a:t>áp</a:t>
+            </a:r>
+            <a:r>
+              <a:rPr lang="en-US" sz="2400" dirty="0" smtClean="0">
+                <a:latin typeface="Arial" panose="020B0604020202020204" pitchFamily="34" charset="0"/>
+                <a:cs typeface="Arial" panose="020B0604020202020204" pitchFamily="34" charset="0"/>
+              </a:rPr>
+              <a:t> </a:t>
+            </a:r>
+            <a:r>
+              <a:rPr lang="en-US" sz="2400" dirty="0" err="1" smtClean="0">
+                <a:latin typeface="Arial" panose="020B0604020202020204" pitchFamily="34" charset="0"/>
+                <a:cs typeface="Arial" panose="020B0604020202020204" pitchFamily="34" charset="0"/>
+              </a:rPr>
+              <a:t>lực</a:t>
+            </a:r>
+            <a:r>
+              <a:rPr lang="en-US" sz="2400" dirty="0" smtClean="0">
+                <a:latin typeface="Arial" panose="020B0604020202020204" pitchFamily="34" charset="0"/>
+                <a:cs typeface="Arial" panose="020B0604020202020204" pitchFamily="34" charset="0"/>
+              </a:rPr>
+              <a:t> </a:t>
+            </a:r>
+            <a:r>
+              <a:rPr lang="en-US" sz="2400" dirty="0" err="1" smtClean="0">
+                <a:latin typeface="Arial" panose="020B0604020202020204" pitchFamily="34" charset="0"/>
+                <a:cs typeface="Arial" panose="020B0604020202020204" pitchFamily="34" charset="0"/>
+              </a:rPr>
+              <a:t>không</a:t>
+            </a:r>
+            <a:r>
+              <a:rPr lang="en-US" sz="2400" dirty="0" smtClean="0">
+                <a:latin typeface="Arial" panose="020B0604020202020204" pitchFamily="34" charset="0"/>
+                <a:cs typeface="Arial" panose="020B0604020202020204" pitchFamily="34" charset="0"/>
+              </a:rPr>
+              <a:t> </a:t>
+            </a:r>
+            <a:r>
+              <a:rPr lang="en-US" sz="2400" dirty="0" err="1" smtClean="0">
+                <a:latin typeface="Arial" panose="020B0604020202020204" pitchFamily="34" charset="0"/>
+                <a:cs typeface="Arial" panose="020B0604020202020204" pitchFamily="34" charset="0"/>
+              </a:rPr>
+              <a:t>và</a:t>
+            </a:r>
+            <a:r>
+              <a:rPr lang="en-US" sz="2400" dirty="0" smtClean="0">
+                <a:latin typeface="Arial" panose="020B0604020202020204" pitchFamily="34" charset="0"/>
+                <a:cs typeface="Arial" panose="020B0604020202020204" pitchFamily="34" charset="0"/>
+              </a:rPr>
+              <a:t> </a:t>
+            </a:r>
+            <a:r>
+              <a:rPr lang="en-US" sz="2400" dirty="0" err="1" smtClean="0">
+                <a:latin typeface="Arial" panose="020B0604020202020204" pitchFamily="34" charset="0"/>
+                <a:cs typeface="Arial" panose="020B0604020202020204" pitchFamily="34" charset="0"/>
+              </a:rPr>
+              <a:t>những</a:t>
+            </a:r>
+            <a:r>
+              <a:rPr lang="en-US" sz="2400" dirty="0" smtClean="0">
+                <a:latin typeface="Arial" panose="020B0604020202020204" pitchFamily="34" charset="0"/>
+                <a:cs typeface="Arial" panose="020B0604020202020204" pitchFamily="34" charset="0"/>
+              </a:rPr>
+              <a:t> </a:t>
+            </a:r>
+            <a:r>
+              <a:rPr lang="en-US" sz="2400" dirty="0" err="1" smtClean="0">
+                <a:latin typeface="Arial" panose="020B0604020202020204" pitchFamily="34" charset="0"/>
+                <a:cs typeface="Arial" panose="020B0604020202020204" pitchFamily="34" charset="0"/>
+              </a:rPr>
+              <a:t>cái</a:t>
+            </a:r>
+            <a:r>
+              <a:rPr lang="en-US" sz="2400" dirty="0" smtClean="0">
+                <a:latin typeface="Arial" panose="020B0604020202020204" pitchFamily="34" charset="0"/>
+                <a:cs typeface="Arial" panose="020B0604020202020204" pitchFamily="34" charset="0"/>
+              </a:rPr>
+              <a:t> </a:t>
+            </a:r>
+            <a:r>
+              <a:rPr lang="en-US" sz="2400" dirty="0" err="1" smtClean="0">
+                <a:latin typeface="Arial" panose="020B0604020202020204" pitchFamily="34" charset="0"/>
+                <a:cs typeface="Arial" panose="020B0604020202020204" pitchFamily="34" charset="0"/>
+              </a:rPr>
+              <a:t>áp</a:t>
+            </a:r>
+            <a:r>
+              <a:rPr lang="en-US" sz="2400" dirty="0" smtClean="0">
+                <a:latin typeface="Arial" panose="020B0604020202020204" pitchFamily="34" charset="0"/>
+                <a:cs typeface="Arial" panose="020B0604020202020204" pitchFamily="34" charset="0"/>
+              </a:rPr>
+              <a:t> </a:t>
+            </a:r>
+            <a:r>
+              <a:rPr lang="en-US" sz="2400" dirty="0" err="1" smtClean="0">
+                <a:latin typeface="Arial" panose="020B0604020202020204" pitchFamily="34" charset="0"/>
+                <a:cs typeface="Arial" panose="020B0604020202020204" pitchFamily="34" charset="0"/>
+              </a:rPr>
+              <a:t>lực</a:t>
+            </a:r>
+            <a:r>
+              <a:rPr lang="en-US" sz="2400" dirty="0" smtClean="0">
+                <a:latin typeface="Arial" panose="020B0604020202020204" pitchFamily="34" charset="0"/>
+                <a:cs typeface="Arial" panose="020B0604020202020204" pitchFamily="34" charset="0"/>
+              </a:rPr>
+              <a:t> </a:t>
+            </a:r>
+            <a:r>
+              <a:rPr lang="en-US" sz="2400" dirty="0" err="1" smtClean="0">
+                <a:latin typeface="Arial" panose="020B0604020202020204" pitchFamily="34" charset="0"/>
+                <a:cs typeface="Arial" panose="020B0604020202020204" pitchFamily="34" charset="0"/>
+              </a:rPr>
+              <a:t>đó</a:t>
+            </a:r>
+            <a:r>
+              <a:rPr lang="en-US" sz="2400" dirty="0" smtClean="0">
+                <a:latin typeface="Arial" panose="020B0604020202020204" pitchFamily="34" charset="0"/>
+                <a:cs typeface="Arial" panose="020B0604020202020204" pitchFamily="34" charset="0"/>
+              </a:rPr>
+              <a:t> </a:t>
+            </a:r>
+            <a:r>
+              <a:rPr lang="en-US" sz="2400" dirty="0" err="1" smtClean="0">
+                <a:latin typeface="Arial" panose="020B0604020202020204" pitchFamily="34" charset="0"/>
+                <a:cs typeface="Arial" panose="020B0604020202020204" pitchFamily="34" charset="0"/>
+              </a:rPr>
+              <a:t>thì</a:t>
+            </a:r>
+            <a:r>
+              <a:rPr lang="en-US" sz="2400" dirty="0" smtClean="0">
+                <a:latin typeface="Arial" panose="020B0604020202020204" pitchFamily="34" charset="0"/>
+                <a:cs typeface="Arial" panose="020B0604020202020204" pitchFamily="34" charset="0"/>
+              </a:rPr>
+              <a:t> </a:t>
+            </a:r>
+            <a:r>
+              <a:rPr lang="en-US" sz="2400" dirty="0" err="1" smtClean="0">
+                <a:latin typeface="Arial" panose="020B0604020202020204" pitchFamily="34" charset="0"/>
+                <a:cs typeface="Arial" panose="020B0604020202020204" pitchFamily="34" charset="0"/>
+              </a:rPr>
+              <a:t>anh</a:t>
+            </a:r>
+            <a:r>
+              <a:rPr lang="en-US" sz="2400" dirty="0" smtClean="0">
+                <a:latin typeface="Arial" panose="020B0604020202020204" pitchFamily="34" charset="0"/>
+                <a:cs typeface="Arial" panose="020B0604020202020204" pitchFamily="34" charset="0"/>
+              </a:rPr>
+              <a:t> </a:t>
+            </a:r>
+            <a:r>
+              <a:rPr lang="en-US" sz="2400" dirty="0" err="1" smtClean="0">
+                <a:latin typeface="Arial" panose="020B0604020202020204" pitchFamily="34" charset="0"/>
+                <a:cs typeface="Arial" panose="020B0604020202020204" pitchFamily="34" charset="0"/>
+              </a:rPr>
+              <a:t>đã</a:t>
+            </a:r>
+            <a:r>
+              <a:rPr lang="en-US" sz="2400" dirty="0" smtClean="0">
+                <a:latin typeface="Arial" panose="020B0604020202020204" pitchFamily="34" charset="0"/>
+                <a:cs typeface="Arial" panose="020B0604020202020204" pitchFamily="34" charset="0"/>
+              </a:rPr>
+              <a:t> </a:t>
+            </a:r>
+            <a:r>
+              <a:rPr lang="en-US" sz="2400" dirty="0" err="1" smtClean="0">
+                <a:latin typeface="Arial" panose="020B0604020202020204" pitchFamily="34" charset="0"/>
+                <a:cs typeface="Arial" panose="020B0604020202020204" pitchFamily="34" charset="0"/>
+              </a:rPr>
+              <a:t>giải</a:t>
+            </a:r>
+            <a:r>
+              <a:rPr lang="en-US" sz="2400" dirty="0" smtClean="0">
+                <a:latin typeface="Arial" panose="020B0604020202020204" pitchFamily="34" charset="0"/>
+                <a:cs typeface="Arial" panose="020B0604020202020204" pitchFamily="34" charset="0"/>
+              </a:rPr>
+              <a:t> </a:t>
+            </a:r>
+            <a:r>
+              <a:rPr lang="en-US" sz="2400" dirty="0" err="1" smtClean="0">
+                <a:latin typeface="Arial" panose="020B0604020202020204" pitchFamily="34" charset="0"/>
+                <a:cs typeface="Arial" panose="020B0604020202020204" pitchFamily="34" charset="0"/>
+              </a:rPr>
+              <a:t>quyết</a:t>
+            </a:r>
+            <a:r>
+              <a:rPr lang="en-US" sz="2400" dirty="0" smtClean="0">
+                <a:latin typeface="Arial" panose="020B0604020202020204" pitchFamily="34" charset="0"/>
+                <a:cs typeface="Arial" panose="020B0604020202020204" pitchFamily="34" charset="0"/>
+              </a:rPr>
+              <a:t> </a:t>
+            </a:r>
+            <a:r>
+              <a:rPr lang="en-US" sz="2400" dirty="0" err="1" smtClean="0">
+                <a:latin typeface="Arial" panose="020B0604020202020204" pitchFamily="34" charset="0"/>
+                <a:cs typeface="Arial" panose="020B0604020202020204" pitchFamily="34" charset="0"/>
+              </a:rPr>
+              <a:t>chúng</a:t>
+            </a:r>
+            <a:r>
+              <a:rPr lang="en-US" sz="2400" dirty="0" smtClean="0">
+                <a:latin typeface="Arial" panose="020B0604020202020204" pitchFamily="34" charset="0"/>
+                <a:cs typeface="Arial" panose="020B0604020202020204" pitchFamily="34" charset="0"/>
+              </a:rPr>
+              <a:t> </a:t>
+            </a:r>
+            <a:r>
+              <a:rPr lang="en-US" sz="2400" dirty="0" err="1" smtClean="0">
+                <a:latin typeface="Arial" panose="020B0604020202020204" pitchFamily="34" charset="0"/>
+                <a:cs typeface="Arial" panose="020B0604020202020204" pitchFamily="34" charset="0"/>
+              </a:rPr>
+              <a:t>như</a:t>
+            </a:r>
+            <a:r>
+              <a:rPr lang="en-US" sz="2400" dirty="0" smtClean="0">
+                <a:latin typeface="Arial" panose="020B0604020202020204" pitchFamily="34" charset="0"/>
+                <a:cs typeface="Arial" panose="020B0604020202020204" pitchFamily="34" charset="0"/>
+              </a:rPr>
+              <a:t> </a:t>
+            </a:r>
+            <a:r>
+              <a:rPr lang="en-US" sz="2400" dirty="0" err="1" smtClean="0">
+                <a:latin typeface="Arial" panose="020B0604020202020204" pitchFamily="34" charset="0"/>
+                <a:cs typeface="Arial" panose="020B0604020202020204" pitchFamily="34" charset="0"/>
+              </a:rPr>
+              <a:t>thế</a:t>
+            </a:r>
+            <a:r>
+              <a:rPr lang="en-US" sz="2400" dirty="0" smtClean="0">
+                <a:latin typeface="Arial" panose="020B0604020202020204" pitchFamily="34" charset="0"/>
+                <a:cs typeface="Arial" panose="020B0604020202020204" pitchFamily="34" charset="0"/>
+              </a:rPr>
+              <a:t> </a:t>
+            </a:r>
+            <a:r>
+              <a:rPr lang="en-US" sz="2400" dirty="0" err="1" smtClean="0">
+                <a:latin typeface="Arial" panose="020B0604020202020204" pitchFamily="34" charset="0"/>
+                <a:cs typeface="Arial" panose="020B0604020202020204" pitchFamily="34" charset="0"/>
+              </a:rPr>
+              <a:t>nào</a:t>
+            </a:r>
+            <a:r>
+              <a:rPr lang="en-US" sz="2400" dirty="0" smtClean="0">
+                <a:latin typeface="Arial" panose="020B0604020202020204" pitchFamily="34" charset="0"/>
+                <a:cs typeface="Arial" panose="020B0604020202020204" pitchFamily="34" charset="0"/>
+              </a:rPr>
+              <a:t> ?</a:t>
+            </a:r>
+          </a:p>
+          <a:p>
+            <a:pPr>
+              <a:buFont typeface="Arial" panose="020B0604020202020204" pitchFamily="34" charset="0"/>
+              <a:buChar char="•"/>
+            </a:pPr>
+            <a:r>
+              <a:rPr lang="en-US" sz="2400" dirty="0" err="1" smtClean="0">
+                <a:latin typeface="Arial" panose="020B0604020202020204" pitchFamily="34" charset="0"/>
+                <a:cs typeface="Arial" panose="020B0604020202020204" pitchFamily="34" charset="0"/>
+              </a:rPr>
+              <a:t>Sau</a:t>
+            </a:r>
+            <a:r>
+              <a:rPr lang="en-US" sz="2400" dirty="0" smtClean="0">
+                <a:latin typeface="Arial" panose="020B0604020202020204" pitchFamily="34" charset="0"/>
+                <a:cs typeface="Arial" panose="020B0604020202020204" pitchFamily="34" charset="0"/>
+              </a:rPr>
+              <a:t> </a:t>
+            </a:r>
+            <a:r>
+              <a:rPr lang="en-US" sz="2400" dirty="0" err="1" smtClean="0">
+                <a:latin typeface="Arial" panose="020B0604020202020204" pitchFamily="34" charset="0"/>
+                <a:cs typeface="Arial" panose="020B0604020202020204" pitchFamily="34" charset="0"/>
+              </a:rPr>
+              <a:t>khi</a:t>
+            </a:r>
+            <a:r>
+              <a:rPr lang="en-US" sz="2400" dirty="0" smtClean="0">
+                <a:latin typeface="Arial" panose="020B0604020202020204" pitchFamily="34" charset="0"/>
+                <a:cs typeface="Arial" panose="020B0604020202020204" pitchFamily="34" charset="0"/>
+              </a:rPr>
+              <a:t> </a:t>
+            </a:r>
+            <a:r>
+              <a:rPr lang="en-US" sz="2400" dirty="0" err="1" smtClean="0">
+                <a:latin typeface="Arial" panose="020B0604020202020204" pitchFamily="34" charset="0"/>
+                <a:cs typeface="Arial" panose="020B0604020202020204" pitchFamily="34" charset="0"/>
+              </a:rPr>
+              <a:t>tốt</a:t>
+            </a:r>
+            <a:r>
+              <a:rPr lang="en-US" sz="2400" dirty="0" smtClean="0">
+                <a:latin typeface="Arial" panose="020B0604020202020204" pitchFamily="34" charset="0"/>
+                <a:cs typeface="Arial" panose="020B0604020202020204" pitchFamily="34" charset="0"/>
+              </a:rPr>
+              <a:t> </a:t>
+            </a:r>
+            <a:r>
+              <a:rPr lang="en-US" sz="2400" dirty="0" err="1" smtClean="0">
+                <a:latin typeface="Arial" panose="020B0604020202020204" pitchFamily="34" charset="0"/>
+                <a:cs typeface="Arial" panose="020B0604020202020204" pitchFamily="34" charset="0"/>
+              </a:rPr>
+              <a:t>nghiệp</a:t>
+            </a:r>
+            <a:r>
+              <a:rPr lang="en-US" sz="2400" dirty="0" smtClean="0">
+                <a:latin typeface="Arial" panose="020B0604020202020204" pitchFamily="34" charset="0"/>
+                <a:cs typeface="Arial" panose="020B0604020202020204" pitchFamily="34" charset="0"/>
+              </a:rPr>
+              <a:t>, </a:t>
+            </a:r>
+            <a:r>
+              <a:rPr lang="en-US" sz="2400" dirty="0" err="1" smtClean="0">
+                <a:latin typeface="Arial" panose="020B0604020202020204" pitchFamily="34" charset="0"/>
+                <a:cs typeface="Arial" panose="020B0604020202020204" pitchFamily="34" charset="0"/>
+              </a:rPr>
+              <a:t>anh</a:t>
+            </a:r>
+            <a:r>
+              <a:rPr lang="en-US" sz="2400" dirty="0" smtClean="0">
+                <a:latin typeface="Arial" panose="020B0604020202020204" pitchFamily="34" charset="0"/>
+                <a:cs typeface="Arial" panose="020B0604020202020204" pitchFamily="34" charset="0"/>
+              </a:rPr>
+              <a:t> </a:t>
+            </a:r>
+            <a:r>
+              <a:rPr lang="en-US" sz="2400" dirty="0" err="1" smtClean="0">
+                <a:latin typeface="Arial" panose="020B0604020202020204" pitchFamily="34" charset="0"/>
+                <a:cs typeface="Arial" panose="020B0604020202020204" pitchFamily="34" charset="0"/>
+              </a:rPr>
+              <a:t>đã</a:t>
+            </a:r>
+            <a:r>
+              <a:rPr lang="en-US" sz="2400" dirty="0" smtClean="0">
+                <a:latin typeface="Arial" panose="020B0604020202020204" pitchFamily="34" charset="0"/>
+                <a:cs typeface="Arial" panose="020B0604020202020204" pitchFamily="34" charset="0"/>
+              </a:rPr>
+              <a:t> </a:t>
+            </a:r>
+            <a:r>
+              <a:rPr lang="en-US" sz="2400" dirty="0" err="1" smtClean="0">
+                <a:latin typeface="Arial" panose="020B0604020202020204" pitchFamily="34" charset="0"/>
+                <a:cs typeface="Arial" panose="020B0604020202020204" pitchFamily="34" charset="0"/>
+              </a:rPr>
+              <a:t>có</a:t>
+            </a:r>
+            <a:r>
+              <a:rPr lang="en-US" sz="2400" dirty="0" smtClean="0">
+                <a:latin typeface="Arial" panose="020B0604020202020204" pitchFamily="34" charset="0"/>
+                <a:cs typeface="Arial" panose="020B0604020202020204" pitchFamily="34" charset="0"/>
+              </a:rPr>
+              <a:t> </a:t>
+            </a:r>
+            <a:r>
+              <a:rPr lang="en-US" sz="2400" dirty="0" err="1" smtClean="0">
+                <a:latin typeface="Arial" panose="020B0604020202020204" pitchFamily="34" charset="0"/>
+                <a:cs typeface="Arial" panose="020B0604020202020204" pitchFamily="34" charset="0"/>
+              </a:rPr>
+              <a:t>những</a:t>
+            </a:r>
+            <a:r>
+              <a:rPr lang="en-US" sz="2400" dirty="0" smtClean="0">
+                <a:latin typeface="Arial" panose="020B0604020202020204" pitchFamily="34" charset="0"/>
+                <a:cs typeface="Arial" panose="020B0604020202020204" pitchFamily="34" charset="0"/>
+              </a:rPr>
+              <a:t> </a:t>
+            </a:r>
+            <a:r>
+              <a:rPr lang="en-US" sz="2400" dirty="0" err="1" smtClean="0">
+                <a:latin typeface="Arial" panose="020B0604020202020204" pitchFamily="34" charset="0"/>
+                <a:cs typeface="Arial" panose="020B0604020202020204" pitchFamily="34" charset="0"/>
+              </a:rPr>
+              <a:t>định</a:t>
+            </a:r>
+            <a:r>
+              <a:rPr lang="en-US" sz="2400" dirty="0" smtClean="0">
+                <a:latin typeface="Arial" panose="020B0604020202020204" pitchFamily="34" charset="0"/>
+                <a:cs typeface="Arial" panose="020B0604020202020204" pitchFamily="34" charset="0"/>
+              </a:rPr>
+              <a:t> </a:t>
+            </a:r>
+            <a:r>
+              <a:rPr lang="en-US" sz="2400" dirty="0" err="1" smtClean="0">
+                <a:latin typeface="Arial" panose="020B0604020202020204" pitchFamily="34" charset="0"/>
+                <a:cs typeface="Arial" panose="020B0604020202020204" pitchFamily="34" charset="0"/>
+              </a:rPr>
+              <a:t>hướng</a:t>
+            </a:r>
+            <a:r>
+              <a:rPr lang="en-US" sz="2400" dirty="0" smtClean="0">
+                <a:latin typeface="Arial" panose="020B0604020202020204" pitchFamily="34" charset="0"/>
+                <a:cs typeface="Arial" panose="020B0604020202020204" pitchFamily="34" charset="0"/>
+              </a:rPr>
+              <a:t> </a:t>
+            </a:r>
+            <a:r>
+              <a:rPr lang="en-US" sz="2400" dirty="0" err="1" smtClean="0">
+                <a:latin typeface="Arial" panose="020B0604020202020204" pitchFamily="34" charset="0"/>
+                <a:cs typeface="Arial" panose="020B0604020202020204" pitchFamily="34" charset="0"/>
+              </a:rPr>
+              <a:t>gì</a:t>
+            </a:r>
+            <a:r>
+              <a:rPr lang="en-US" sz="2400" dirty="0" smtClean="0">
+                <a:latin typeface="Arial" panose="020B0604020202020204" pitchFamily="34" charset="0"/>
+                <a:cs typeface="Arial" panose="020B0604020202020204" pitchFamily="34" charset="0"/>
+              </a:rPr>
+              <a:t> </a:t>
+            </a:r>
+            <a:r>
+              <a:rPr lang="en-US" sz="2400" dirty="0" err="1" smtClean="0">
+                <a:latin typeface="Arial" panose="020B0604020202020204" pitchFamily="34" charset="0"/>
+                <a:cs typeface="Arial" panose="020B0604020202020204" pitchFamily="34" charset="0"/>
+              </a:rPr>
+              <a:t>cho</a:t>
+            </a:r>
+            <a:r>
+              <a:rPr lang="en-US" sz="2400" dirty="0" smtClean="0">
+                <a:latin typeface="Arial" panose="020B0604020202020204" pitchFamily="34" charset="0"/>
+                <a:cs typeface="Arial" panose="020B0604020202020204" pitchFamily="34" charset="0"/>
+              </a:rPr>
+              <a:t> </a:t>
+            </a:r>
+            <a:r>
+              <a:rPr lang="en-US" sz="2400" dirty="0" err="1" smtClean="0">
+                <a:latin typeface="Arial" panose="020B0604020202020204" pitchFamily="34" charset="0"/>
+                <a:cs typeface="Arial" panose="020B0604020202020204" pitchFamily="34" charset="0"/>
+              </a:rPr>
+              <a:t>mình</a:t>
+            </a:r>
+            <a:r>
+              <a:rPr lang="en-US" sz="2400" dirty="0" smtClean="0">
+                <a:latin typeface="Arial" panose="020B0604020202020204" pitchFamily="34" charset="0"/>
+                <a:cs typeface="Arial" panose="020B0604020202020204" pitchFamily="34" charset="0"/>
+              </a:rPr>
+              <a:t> </a:t>
+            </a:r>
+            <a:r>
+              <a:rPr lang="en-US" sz="2400" dirty="0" err="1" smtClean="0">
+                <a:latin typeface="Arial" panose="020B0604020202020204" pitchFamily="34" charset="0"/>
+                <a:cs typeface="Arial" panose="020B0604020202020204" pitchFamily="34" charset="0"/>
+              </a:rPr>
+              <a:t>chưa</a:t>
+            </a:r>
+            <a:r>
+              <a:rPr lang="en-US" sz="2400" dirty="0">
+                <a:latin typeface="Arial" panose="020B0604020202020204" pitchFamily="34" charset="0"/>
+                <a:cs typeface="Arial" panose="020B0604020202020204" pitchFamily="34" charset="0"/>
+              </a:rPr>
+              <a:t> </a:t>
+            </a:r>
+            <a:r>
+              <a:rPr lang="en-US" sz="2400" dirty="0" smtClean="0">
+                <a:latin typeface="Arial" panose="020B0604020202020204" pitchFamily="34" charset="0"/>
+                <a:cs typeface="Arial" panose="020B0604020202020204" pitchFamily="34" charset="0"/>
+              </a:rPr>
+              <a:t>?</a:t>
+            </a:r>
+          </a:p>
+          <a:p>
+            <a:pPr>
+              <a:buFont typeface="Arial" panose="020B0604020202020204" pitchFamily="34" charset="0"/>
+              <a:buChar char="•"/>
+            </a:pPr>
+            <a:r>
+              <a:rPr lang="en-US" sz="2400" dirty="0" err="1" smtClean="0">
+                <a:latin typeface="Arial" panose="020B0604020202020204" pitchFamily="34" charset="0"/>
+                <a:cs typeface="Arial" panose="020B0604020202020204" pitchFamily="34" charset="0"/>
+              </a:rPr>
+              <a:t>Anh</a:t>
+            </a:r>
+            <a:r>
+              <a:rPr lang="en-US" sz="2400" dirty="0" smtClean="0">
+                <a:latin typeface="Arial" panose="020B0604020202020204" pitchFamily="34" charset="0"/>
+                <a:cs typeface="Arial" panose="020B0604020202020204" pitchFamily="34" charset="0"/>
+              </a:rPr>
+              <a:t> </a:t>
+            </a:r>
+            <a:r>
+              <a:rPr lang="en-US" sz="2400" dirty="0" err="1" smtClean="0">
+                <a:latin typeface="Arial" panose="020B0604020202020204" pitchFamily="34" charset="0"/>
+                <a:cs typeface="Arial" panose="020B0604020202020204" pitchFamily="34" charset="0"/>
+              </a:rPr>
+              <a:t>có</a:t>
+            </a:r>
+            <a:r>
+              <a:rPr lang="en-US" sz="2400" dirty="0" smtClean="0">
+                <a:latin typeface="Arial" panose="020B0604020202020204" pitchFamily="34" charset="0"/>
+                <a:cs typeface="Arial" panose="020B0604020202020204" pitchFamily="34" charset="0"/>
+              </a:rPr>
+              <a:t> </a:t>
+            </a:r>
+            <a:r>
+              <a:rPr lang="en-US" sz="2400" dirty="0" err="1" smtClean="0">
+                <a:latin typeface="Arial" panose="020B0604020202020204" pitchFamily="34" charset="0"/>
+                <a:cs typeface="Arial" panose="020B0604020202020204" pitchFamily="34" charset="0"/>
+              </a:rPr>
+              <a:t>đưa</a:t>
+            </a:r>
+            <a:r>
+              <a:rPr lang="en-US" sz="2400" dirty="0" smtClean="0">
+                <a:latin typeface="Arial" panose="020B0604020202020204" pitchFamily="34" charset="0"/>
+                <a:cs typeface="Arial" panose="020B0604020202020204" pitchFamily="34" charset="0"/>
+              </a:rPr>
+              <a:t> </a:t>
+            </a:r>
+            <a:r>
+              <a:rPr lang="en-US" sz="2400" dirty="0" err="1" smtClean="0">
+                <a:latin typeface="Arial" panose="020B0604020202020204" pitchFamily="34" charset="0"/>
+                <a:cs typeface="Arial" panose="020B0604020202020204" pitchFamily="34" charset="0"/>
+              </a:rPr>
+              <a:t>ra</a:t>
+            </a:r>
+            <a:r>
+              <a:rPr lang="en-US" sz="2400" dirty="0" smtClean="0">
+                <a:latin typeface="Arial" panose="020B0604020202020204" pitchFamily="34" charset="0"/>
+                <a:cs typeface="Arial" panose="020B0604020202020204" pitchFamily="34" charset="0"/>
+              </a:rPr>
+              <a:t> </a:t>
+            </a:r>
+            <a:r>
+              <a:rPr lang="en-US" sz="2400" dirty="0" err="1" smtClean="0">
+                <a:latin typeface="Arial" panose="020B0604020202020204" pitchFamily="34" charset="0"/>
+                <a:cs typeface="Arial" panose="020B0604020202020204" pitchFamily="34" charset="0"/>
+              </a:rPr>
+              <a:t>lời</a:t>
+            </a:r>
+            <a:r>
+              <a:rPr lang="en-US" sz="2400" dirty="0" smtClean="0">
+                <a:latin typeface="Arial" panose="020B0604020202020204" pitchFamily="34" charset="0"/>
+                <a:cs typeface="Arial" panose="020B0604020202020204" pitchFamily="34" charset="0"/>
+              </a:rPr>
+              <a:t> </a:t>
+            </a:r>
+            <a:r>
+              <a:rPr lang="en-US" sz="2400" dirty="0" err="1" smtClean="0">
+                <a:latin typeface="Arial" panose="020B0604020202020204" pitchFamily="34" charset="0"/>
+                <a:cs typeface="Arial" panose="020B0604020202020204" pitchFamily="34" charset="0"/>
+              </a:rPr>
+              <a:t>khuyên</a:t>
+            </a:r>
+            <a:r>
+              <a:rPr lang="en-US" sz="2400" dirty="0" smtClean="0">
+                <a:latin typeface="Arial" panose="020B0604020202020204" pitchFamily="34" charset="0"/>
+                <a:cs typeface="Arial" panose="020B0604020202020204" pitchFamily="34" charset="0"/>
+              </a:rPr>
+              <a:t> </a:t>
+            </a:r>
+            <a:r>
+              <a:rPr lang="en-US" sz="2400" dirty="0" err="1" smtClean="0">
+                <a:latin typeface="Arial" panose="020B0604020202020204" pitchFamily="34" charset="0"/>
+                <a:cs typeface="Arial" panose="020B0604020202020204" pitchFamily="34" charset="0"/>
+              </a:rPr>
+              <a:t>gì</a:t>
+            </a:r>
+            <a:r>
+              <a:rPr lang="en-US" sz="2400" dirty="0" smtClean="0">
+                <a:latin typeface="Arial" panose="020B0604020202020204" pitchFamily="34" charset="0"/>
+                <a:cs typeface="Arial" panose="020B0604020202020204" pitchFamily="34" charset="0"/>
+              </a:rPr>
+              <a:t> </a:t>
+            </a:r>
+            <a:r>
+              <a:rPr lang="en-US" sz="2400" dirty="0" err="1" smtClean="0">
+                <a:latin typeface="Arial" panose="020B0604020202020204" pitchFamily="34" charset="0"/>
+                <a:cs typeface="Arial" panose="020B0604020202020204" pitchFamily="34" charset="0"/>
+              </a:rPr>
+              <a:t>dành</a:t>
+            </a:r>
+            <a:r>
+              <a:rPr lang="en-US" sz="2400" dirty="0" smtClean="0">
+                <a:latin typeface="Arial" panose="020B0604020202020204" pitchFamily="34" charset="0"/>
+                <a:cs typeface="Arial" panose="020B0604020202020204" pitchFamily="34" charset="0"/>
+              </a:rPr>
+              <a:t> </a:t>
+            </a:r>
+            <a:r>
+              <a:rPr lang="en-US" sz="2400" dirty="0" err="1" smtClean="0">
+                <a:latin typeface="Arial" panose="020B0604020202020204" pitchFamily="34" charset="0"/>
+                <a:cs typeface="Arial" panose="020B0604020202020204" pitchFamily="34" charset="0"/>
+              </a:rPr>
+              <a:t>cho</a:t>
+            </a:r>
+            <a:r>
+              <a:rPr lang="en-US" sz="2400" dirty="0" smtClean="0">
+                <a:latin typeface="Arial" panose="020B0604020202020204" pitchFamily="34" charset="0"/>
+                <a:cs typeface="Arial" panose="020B0604020202020204" pitchFamily="34" charset="0"/>
+              </a:rPr>
+              <a:t> </a:t>
+            </a:r>
+            <a:r>
+              <a:rPr lang="en-US" sz="2400" dirty="0" err="1" smtClean="0">
+                <a:latin typeface="Arial" panose="020B0604020202020204" pitchFamily="34" charset="0"/>
+                <a:cs typeface="Arial" panose="020B0604020202020204" pitchFamily="34" charset="0"/>
+              </a:rPr>
+              <a:t>sinh</a:t>
+            </a:r>
+            <a:r>
+              <a:rPr lang="en-US" sz="2400" dirty="0" smtClean="0">
+                <a:latin typeface="Arial" panose="020B0604020202020204" pitchFamily="34" charset="0"/>
+                <a:cs typeface="Arial" panose="020B0604020202020204" pitchFamily="34" charset="0"/>
+              </a:rPr>
+              <a:t> </a:t>
+            </a:r>
+            <a:r>
+              <a:rPr lang="en-US" sz="2400" dirty="0" err="1" smtClean="0">
+                <a:latin typeface="Arial" panose="020B0604020202020204" pitchFamily="34" charset="0"/>
+                <a:cs typeface="Arial" panose="020B0604020202020204" pitchFamily="34" charset="0"/>
+              </a:rPr>
+              <a:t>viên</a:t>
+            </a:r>
+            <a:r>
+              <a:rPr lang="en-US" sz="2400" dirty="0" smtClean="0">
+                <a:latin typeface="Arial" panose="020B0604020202020204" pitchFamily="34" charset="0"/>
+                <a:cs typeface="Arial" panose="020B0604020202020204" pitchFamily="34" charset="0"/>
+              </a:rPr>
+              <a:t> hay </a:t>
+            </a:r>
+            <a:r>
+              <a:rPr lang="en-US" sz="2400" dirty="0" err="1" smtClean="0">
+                <a:latin typeface="Arial" panose="020B0604020202020204" pitchFamily="34" charset="0"/>
+                <a:cs typeface="Arial" panose="020B0604020202020204" pitchFamily="34" charset="0"/>
+              </a:rPr>
+              <a:t>không</a:t>
+            </a:r>
+            <a:r>
+              <a:rPr lang="en-US" sz="2400" dirty="0" smtClean="0">
+                <a:latin typeface="Arial" panose="020B0604020202020204" pitchFamily="34" charset="0"/>
+                <a:cs typeface="Arial" panose="020B0604020202020204" pitchFamily="34" charset="0"/>
+              </a:rPr>
+              <a:t> ?</a:t>
+            </a:r>
+            <a:endParaRPr lang="en-US" sz="2400" dirty="0">
+              <a:latin typeface="Arial" panose="020B0604020202020204" pitchFamily="34" charset="0"/>
+              <a:cs typeface="Arial" panose="020B0604020202020204" pitchFamily="34" charset="0"/>
+            </a:endParaRPr>
           </a:p>
         </p:txBody>
       </p:sp>
@@ -11255,10 +12972,57 @@
         </p:nvSpPr>
         <p:spPr/>
         <p:txBody>
-          <a:bodyPr/>
+          <a:bodyPr>
+            <a:normAutofit/>
+          </a:bodyPr>
           <a:lstStyle/>
           <a:p>
-            <a:endParaRPr lang="en-US"/>
+            <a:r>
+              <a:rPr lang="en-US" sz="2400" dirty="0" smtClean="0">
+                <a:latin typeface="Arial" panose="020B0604020202020204" pitchFamily="34" charset="0"/>
+                <a:cs typeface="Arial" panose="020B0604020202020204" pitchFamily="34" charset="0"/>
+              </a:rPr>
+              <a:t>c. </a:t>
+            </a:r>
+            <a:r>
+              <a:rPr lang="en-US" sz="2400" dirty="0" err="1" smtClean="0">
+                <a:latin typeface="Arial" panose="020B0604020202020204" pitchFamily="34" charset="0"/>
+                <a:cs typeface="Arial" panose="020B0604020202020204" pitchFamily="34" charset="0"/>
+              </a:rPr>
+              <a:t>Nội</a:t>
+            </a:r>
+            <a:r>
+              <a:rPr lang="en-US" sz="2400" dirty="0" smtClean="0">
+                <a:latin typeface="Arial" panose="020B0604020202020204" pitchFamily="34" charset="0"/>
+                <a:cs typeface="Arial" panose="020B0604020202020204" pitchFamily="34" charset="0"/>
+              </a:rPr>
+              <a:t> dung </a:t>
+            </a:r>
+            <a:r>
+              <a:rPr lang="en-US" sz="2400" dirty="0" err="1" smtClean="0">
+                <a:latin typeface="Arial" panose="020B0604020202020204" pitchFamily="34" charset="0"/>
+                <a:cs typeface="Arial" panose="020B0604020202020204" pitchFamily="34" charset="0"/>
+              </a:rPr>
+              <a:t>phỏng</a:t>
+            </a:r>
+            <a:r>
+              <a:rPr lang="en-US" sz="2400" dirty="0" smtClean="0">
+                <a:latin typeface="Arial" panose="020B0604020202020204" pitchFamily="34" charset="0"/>
+                <a:cs typeface="Arial" panose="020B0604020202020204" pitchFamily="34" charset="0"/>
+              </a:rPr>
+              <a:t> </a:t>
+            </a:r>
+            <a:r>
+              <a:rPr lang="en-US" sz="2400" dirty="0" err="1" smtClean="0">
+                <a:latin typeface="Arial" panose="020B0604020202020204" pitchFamily="34" charset="0"/>
+                <a:cs typeface="Arial" panose="020B0604020202020204" pitchFamily="34" charset="0"/>
+              </a:rPr>
+              <a:t>vấn</a:t>
+            </a:r>
+            <a:endParaRPr lang="en-US" sz="2400" dirty="0">
+              <a:latin typeface="Arial" panose="020B0604020202020204" pitchFamily="34" charset="0"/>
+              <a:cs typeface="Arial" panose="020B0604020202020204" pitchFamily="34" charset="0"/>
+            </a:endParaRPr>
           </a:p>
         </p:txBody>
       </p:sp>
@@ -11316,7 +13080,7 @@
         </p:nvGraphicFramePr>
         <p:xfrm>
           <a:off x="838200" y="2057400"/>
-          <a:ext cx="7467600" cy="3698617"/>
+          <a:ext cx="7467600" cy="3863340"/>
         </p:xfrm>
         <a:graphic>
           <a:graphicData uri="http://schemas.openxmlformats.org/drawingml/2006/table">
@@ -11325,12 +13089,48 @@
                 <a:tableStyleId>{5C22544A-7EE6-4342-B048-85BDC9FD1C3A}</a:tableStyleId>
               </a:tblPr>
               <a:tblGrid>
-                <a:gridCol w="445827"/>
-                <a:gridCol w="1058839"/>
-                <a:gridCol w="1783307"/>
-                <a:gridCol w="1058839"/>
-                <a:gridCol w="2061949"/>
-                <a:gridCol w="1058839"/>
+                <a:gridCol w="445827">
+                  <a:extLst>
+                    <a:ext uri="{9D8B030D-6E8A-4147-A177-3AD203B41FA5}">
+                      <a16:colId xmlns:a16="http://schemas.microsoft.com/office/drawing/2014/main" val="20000"/>
+                    </a:ext>
+                  </a:extLst>
+                </a:gridCol>
+                <a:gridCol w="1058839">
+                  <a:extLst>
+                    <a:ext uri="{9D8B030D-6E8A-4147-A177-3AD203B41FA5}">
+                      <a16:colId xmlns:a16="http://schemas.microsoft.com/office/drawing/2014/main" val="20001"/>
+                    </a:ext>
+                  </a:extLst>
+                </a:gridCol>
+                <a:gridCol w="1783307">
+                  <a:extLst>
+                    <a:ext uri="{9D8B030D-6E8A-4147-A177-3AD203B41FA5}">
+                      <a16:colId xmlns:a16="http://schemas.microsoft.com/office/drawing/2014/main" val="20002"/>
+                    </a:ext>
+                  </a:extLst>
+                </a:gridCol>
+                <a:gridCol w="1058839">
+                  <a:extLst>
+                    <a:ext uri="{9D8B030D-6E8A-4147-A177-3AD203B41FA5}">
+                      <a16:colId xmlns:a16="http://schemas.microsoft.com/office/drawing/2014/main" val="20003"/>
+                    </a:ext>
+                  </a:extLst>
+                </a:gridCol>
+                <a:gridCol w="2061949">
+                  <a:extLst>
+                    <a:ext uri="{9D8B030D-6E8A-4147-A177-3AD203B41FA5}">
+                      <a16:colId xmlns:a16="http://schemas.microsoft.com/office/drawing/2014/main" val="20004"/>
+                    </a:ext>
+                  </a:extLst>
+                </a:gridCol>
+                <a:gridCol w="1058839">
+                  <a:extLst>
+                    <a:ext uri="{9D8B030D-6E8A-4147-A177-3AD203B41FA5}">
+                      <a16:colId xmlns:a16="http://schemas.microsoft.com/office/drawing/2014/main" val="20005"/>
+                    </a:ext>
+                  </a:extLst>
+                </a:gridCol>
               </a:tblGrid>
               <a:tr h="289787">
                 <a:tc>
@@ -11525,6 +13325,11 @@
                   </a:txBody>
                   <a:tcPr marL="66874" marR="66874" marT="0" marB="0" anchor="ctr"/>
                 </a:tc>
+                <a:extLst>
+                  <a:ext uri="{0D108BD9-81ED-4DB2-BD59-A6C34878D82A}">
+                    <a16:rowId xmlns:a16="http://schemas.microsoft.com/office/drawing/2014/main" val="10000"/>
+                  </a:ext>
+                </a:extLst>
               </a:tr>
               <a:tr h="450780">
                 <a:tc>
@@ -11719,6 +13524,11 @@
                   </a:txBody>
                   <a:tcPr marL="66874" marR="66874" marT="0" marB="0" anchor="ctr"/>
                 </a:tc>
+                <a:extLst>
+                  <a:ext uri="{0D108BD9-81ED-4DB2-BD59-A6C34878D82A}">
+                    <a16:rowId xmlns:a16="http://schemas.microsoft.com/office/drawing/2014/main" val="10001"/>
+                  </a:ext>
+                </a:extLst>
               </a:tr>
               <a:tr h="579575">
                 <a:tc>
@@ -11913,6 +13723,11 @@
                   </a:txBody>
                   <a:tcPr marL="66874" marR="66874" marT="0" marB="0" anchor="ctr"/>
                 </a:tc>
+                <a:extLst>
+                  <a:ext uri="{0D108BD9-81ED-4DB2-BD59-A6C34878D82A}">
+                    <a16:rowId xmlns:a16="http://schemas.microsoft.com/office/drawing/2014/main" val="10002"/>
+                  </a:ext>
+                </a:extLst>
               </a:tr>
               <a:tr h="289787">
                 <a:tc>
@@ -12107,6 +13922,11 @@
                   </a:txBody>
                   <a:tcPr marL="66874" marR="66874" marT="0" marB="0" anchor="ctr"/>
                 </a:tc>
+                <a:extLst>
+                  <a:ext uri="{0D108BD9-81ED-4DB2-BD59-A6C34878D82A}">
+                    <a16:rowId xmlns:a16="http://schemas.microsoft.com/office/drawing/2014/main" val="10003"/>
+                  </a:ext>
+                </a:extLst>
               </a:tr>
               <a:tr h="289787">
                 <a:tc>
@@ -12301,6 +14121,11 @@
                   </a:txBody>
                   <a:tcPr marL="66874" marR="66874" marT="0" marB="0" anchor="ctr"/>
                 </a:tc>
+                <a:extLst>
+                  <a:ext uri="{0D108BD9-81ED-4DB2-BD59-A6C34878D82A}">
+                    <a16:rowId xmlns:a16="http://schemas.microsoft.com/office/drawing/2014/main" val="10004"/>
+                  </a:ext>
+                </a:extLst>
               </a:tr>
               <a:tr h="289787">
                 <a:tc>
@@ -12495,6 +14320,11 @@
                   </a:txBody>
                   <a:tcPr marL="66874" marR="66874" marT="0" marB="0" anchor="ctr"/>
                 </a:tc>
+                <a:extLst>
+                  <a:ext uri="{0D108BD9-81ED-4DB2-BD59-A6C34878D82A}">
+                    <a16:rowId xmlns:a16="http://schemas.microsoft.com/office/drawing/2014/main" val="10005"/>
+                  </a:ext>
+                </a:extLst>
               </a:tr>
               <a:tr h="579575">
                 <a:tc>
@@ -12689,6 +14519,11 @@
                   </a:txBody>
                   <a:tcPr marL="66874" marR="66874" marT="0" marB="0" anchor="ctr"/>
                 </a:tc>
+                <a:extLst>
+                  <a:ext uri="{0D108BD9-81ED-4DB2-BD59-A6C34878D82A}">
+                    <a16:rowId xmlns:a16="http://schemas.microsoft.com/office/drawing/2014/main" val="10006"/>
+                  </a:ext>
+                </a:extLst>
               </a:tr>
             </a:tbl>
           </a:graphicData>
@@ -13144,7 +14979,7 @@
         </p:nvGraphicFramePr>
         <p:xfrm>
           <a:off x="914400" y="2083911"/>
-          <a:ext cx="7467600" cy="3698617"/>
+          <a:ext cx="7467600" cy="3863340"/>
         </p:xfrm>
         <a:graphic>
           <a:graphicData uri="http://schemas.openxmlformats.org/drawingml/2006/table">
@@ -13153,12 +14988,48 @@
                 <a:tableStyleId>{5C22544A-7EE6-4342-B048-85BDC9FD1C3A}</a:tableStyleId>
               </a:tblPr>
               <a:tblGrid>
-                <a:gridCol w="445827"/>
-                <a:gridCol w="1058839"/>
-                <a:gridCol w="1783307"/>
-                <a:gridCol w="1058839"/>
-                <a:gridCol w="2061949"/>
-                <a:gridCol w="1058839"/>
+                <a:gridCol w="445827">
+                  <a:extLst>
+                    <a:ext uri="{9D8B030D-6E8A-4147-A177-3AD203B41FA5}">
+                      <a16:colId xmlns:a16="http://schemas.microsoft.com/office/drawing/2014/main" val="20000"/>
+                    </a:ext>
+                  </a:extLst>
+                </a:gridCol>
+                <a:gridCol w="1058839">
+                  <a:extLst>
+                    <a:ext uri="{9D8B030D-6E8A-4147-A177-3AD203B41FA5}">
+                      <a16:colId xmlns:a16="http://schemas.microsoft.com/office/drawing/2014/main" val="20001"/>
+                    </a:ext>
+                  </a:extLst>
+                </a:gridCol>
+                <a:gridCol w="1783307">
+                  <a:extLst>
+                    <a:ext uri="{9D8B030D-6E8A-4147-A177-3AD203B41FA5}">
+                      <a16:colId xmlns:a16="http://schemas.microsoft.com/office/drawing/2014/main" val="20002"/>
+                    </a:ext>
+                  </a:extLst>
+                </a:gridCol>
+                <a:gridCol w="1058839">
+                  <a:extLst>
+                    <a:ext uri="{9D8B030D-6E8A-4147-A177-3AD203B41FA5}">
+                      <a16:colId xmlns:a16="http://schemas.microsoft.com/office/drawing/2014/main" val="20003"/>
+                    </a:ext>
+                  </a:extLst>
+                </a:gridCol>
+                <a:gridCol w="2061949">
+                  <a:extLst>
+                    <a:ext uri="{9D8B030D-6E8A-4147-A177-3AD203B41FA5}">
+                      <a16:colId xmlns:a16="http://schemas.microsoft.com/office/drawing/2014/main" val="20004"/>
+                    </a:ext>
+                  </a:extLst>
+                </a:gridCol>
+                <a:gridCol w="1058839">
+                  <a:extLst>
+                    <a:ext uri="{9D8B030D-6E8A-4147-A177-3AD203B41FA5}">
+                      <a16:colId xmlns:a16="http://schemas.microsoft.com/office/drawing/2014/main" val="20005"/>
+                    </a:ext>
+                  </a:extLst>
+                </a:gridCol>
               </a:tblGrid>
               <a:tr h="289787">
                 <a:tc>
@@ -13353,6 +15224,11 @@
                   </a:txBody>
                   <a:tcPr marL="66874" marR="66874" marT="0" marB="0" anchor="ctr"/>
                 </a:tc>
+                <a:extLst>
+                  <a:ext uri="{0D108BD9-81ED-4DB2-BD59-A6C34878D82A}">
+                    <a16:rowId xmlns:a16="http://schemas.microsoft.com/office/drawing/2014/main" val="10000"/>
+                  </a:ext>
+                </a:extLst>
               </a:tr>
               <a:tr h="450780">
                 <a:tc>
@@ -13547,6 +15423,11 @@
                   </a:txBody>
                   <a:tcPr marL="66874" marR="66874" marT="0" marB="0" anchor="ctr"/>
                 </a:tc>
+                <a:extLst>
+                  <a:ext uri="{0D108BD9-81ED-4DB2-BD59-A6C34878D82A}">
+                    <a16:rowId xmlns:a16="http://schemas.microsoft.com/office/drawing/2014/main" val="10001"/>
+                  </a:ext>
+                </a:extLst>
               </a:tr>
               <a:tr h="579575">
                 <a:tc>
@@ -13741,6 +15622,11 @@
                   </a:txBody>
                   <a:tcPr marL="66874" marR="66874" marT="0" marB="0" anchor="ctr"/>
                 </a:tc>
+                <a:extLst>
+                  <a:ext uri="{0D108BD9-81ED-4DB2-BD59-A6C34878D82A}">
+                    <a16:rowId xmlns:a16="http://schemas.microsoft.com/office/drawing/2014/main" val="10002"/>
+                  </a:ext>
+                </a:extLst>
               </a:tr>
               <a:tr h="289787">
                 <a:tc>
@@ -13935,6 +15821,11 @@
                   </a:txBody>
                   <a:tcPr marL="66874" marR="66874" marT="0" marB="0" anchor="ctr"/>
                 </a:tc>
+                <a:extLst>
+                  <a:ext uri="{0D108BD9-81ED-4DB2-BD59-A6C34878D82A}">
+                    <a16:rowId xmlns:a16="http://schemas.microsoft.com/office/drawing/2014/main" val="10003"/>
+                  </a:ext>
+                </a:extLst>
               </a:tr>
               <a:tr h="289787">
                 <a:tc>
@@ -14129,6 +16020,11 @@
                   </a:txBody>
                   <a:tcPr marL="66874" marR="66874" marT="0" marB="0" anchor="ctr"/>
                 </a:tc>
+                <a:extLst>
+                  <a:ext uri="{0D108BD9-81ED-4DB2-BD59-A6C34878D82A}">
+                    <a16:rowId xmlns:a16="http://schemas.microsoft.com/office/drawing/2014/main" val="10004"/>
+                  </a:ext>
+                </a:extLst>
               </a:tr>
               <a:tr h="289787">
                 <a:tc>
@@ -14323,6 +16219,11 @@
                   </a:txBody>
                   <a:tcPr marL="66874" marR="66874" marT="0" marB="0" anchor="ctr"/>
                 </a:tc>
+                <a:extLst>
+                  <a:ext uri="{0D108BD9-81ED-4DB2-BD59-A6C34878D82A}">
+                    <a16:rowId xmlns:a16="http://schemas.microsoft.com/office/drawing/2014/main" val="10005"/>
+                  </a:ext>
+                </a:extLst>
               </a:tr>
               <a:tr h="579575">
                 <a:tc>
@@ -14517,6 +16418,11 @@
                   </a:txBody>
                   <a:tcPr marL="66874" marR="66874" marT="0" marB="0" anchor="ctr"/>
                 </a:tc>
+                <a:extLst>
+                  <a:ext uri="{0D108BD9-81ED-4DB2-BD59-A6C34878D82A}">
+                    <a16:rowId xmlns:a16="http://schemas.microsoft.com/office/drawing/2014/main" val="10006"/>
+                  </a:ext>
+                </a:extLst>
               </a:tr>
             </a:tbl>
           </a:graphicData>

</xml_diff>